<commit_message>
Front End app added + presentation updated
</commit_message>
<xml_diff>
--- a/Consolidated dashboard for multiple applicationservices Big data analysis.pptx
+++ b/Consolidated dashboard for multiple applicationservices Big data analysis.pptx
@@ -8,6 +8,11 @@
     <p:sldId id="256" r:id="rId2"/>
     <p:sldId id="257" r:id="rId3"/>
     <p:sldId id="258" r:id="rId4"/>
+    <p:sldId id="259" r:id="rId5"/>
+    <p:sldId id="260" r:id="rId6"/>
+    <p:sldId id="261" r:id="rId7"/>
+    <p:sldId id="262" r:id="rId8"/>
+    <p:sldId id="263" r:id="rId9"/>
   </p:sldIdLst>
   <p:sldSz cx="12192000" cy="6858000"/>
   <p:notesSz cx="6858000" cy="9144000"/>
@@ -112,6 +117,2550 @@
     </p:ext>
   </p:extLst>
 </p:presentation>
+</file>
+
+<file path=ppt/diagrams/colors1.xml><?xml version="1.0" encoding="utf-8"?>
+<dgm:colorsDef xmlns:dgm="http://schemas.openxmlformats.org/drawingml/2006/diagram" xmlns:a="http://schemas.openxmlformats.org/drawingml/2006/main" uniqueId="urn:microsoft.com/office/officeart/2005/8/colors/accent1_2">
+  <dgm:title val=""/>
+  <dgm:desc val=""/>
+  <dgm:catLst>
+    <dgm:cat type="accent1" pri="11200"/>
+  </dgm:catLst>
+  <dgm:styleLbl name="node0">
+    <dgm:fillClrLst meth="repeat">
+      <a:schemeClr val="accent1"/>
+    </dgm:fillClrLst>
+    <dgm:linClrLst meth="repeat">
+      <a:schemeClr val="lt1"/>
+    </dgm:linClrLst>
+    <dgm:effectClrLst/>
+    <dgm:txLinClrLst/>
+    <dgm:txFillClrLst/>
+    <dgm:txEffectClrLst/>
+  </dgm:styleLbl>
+  <dgm:styleLbl name="alignNode1">
+    <dgm:fillClrLst meth="repeat">
+      <a:schemeClr val="accent1"/>
+    </dgm:fillClrLst>
+    <dgm:linClrLst meth="repeat">
+      <a:schemeClr val="accent1"/>
+    </dgm:linClrLst>
+    <dgm:effectClrLst/>
+    <dgm:txLinClrLst/>
+    <dgm:txFillClrLst/>
+    <dgm:txEffectClrLst/>
+  </dgm:styleLbl>
+  <dgm:styleLbl name="node1">
+    <dgm:fillClrLst meth="repeat">
+      <a:schemeClr val="accent1"/>
+    </dgm:fillClrLst>
+    <dgm:linClrLst meth="repeat">
+      <a:schemeClr val="lt1"/>
+    </dgm:linClrLst>
+    <dgm:effectClrLst/>
+    <dgm:txLinClrLst/>
+    <dgm:txFillClrLst/>
+    <dgm:txEffectClrLst/>
+  </dgm:styleLbl>
+  <dgm:styleLbl name="lnNode1">
+    <dgm:fillClrLst meth="repeat">
+      <a:schemeClr val="accent1"/>
+    </dgm:fillClrLst>
+    <dgm:linClrLst meth="repeat">
+      <a:schemeClr val="lt1"/>
+    </dgm:linClrLst>
+    <dgm:effectClrLst/>
+    <dgm:txLinClrLst/>
+    <dgm:txFillClrLst/>
+    <dgm:txEffectClrLst/>
+  </dgm:styleLbl>
+  <dgm:styleLbl name="vennNode1">
+    <dgm:fillClrLst meth="repeat">
+      <a:schemeClr val="accent1">
+        <a:alpha val="50000"/>
+      </a:schemeClr>
+    </dgm:fillClrLst>
+    <dgm:linClrLst meth="repeat">
+      <a:schemeClr val="lt1"/>
+    </dgm:linClrLst>
+    <dgm:effectClrLst/>
+    <dgm:txLinClrLst/>
+    <dgm:txFillClrLst/>
+    <dgm:txEffectClrLst/>
+  </dgm:styleLbl>
+  <dgm:styleLbl name="node2">
+    <dgm:fillClrLst meth="repeat">
+      <a:schemeClr val="accent1"/>
+    </dgm:fillClrLst>
+    <dgm:linClrLst meth="repeat">
+      <a:schemeClr val="lt1"/>
+    </dgm:linClrLst>
+    <dgm:effectClrLst/>
+    <dgm:txLinClrLst/>
+    <dgm:txFillClrLst/>
+    <dgm:txEffectClrLst/>
+  </dgm:styleLbl>
+  <dgm:styleLbl name="node3">
+    <dgm:fillClrLst meth="repeat">
+      <a:schemeClr val="accent1"/>
+    </dgm:fillClrLst>
+    <dgm:linClrLst meth="repeat">
+      <a:schemeClr val="lt1"/>
+    </dgm:linClrLst>
+    <dgm:effectClrLst/>
+    <dgm:txLinClrLst/>
+    <dgm:txFillClrLst/>
+    <dgm:txEffectClrLst/>
+  </dgm:styleLbl>
+  <dgm:styleLbl name="node4">
+    <dgm:fillClrLst meth="repeat">
+      <a:schemeClr val="accent1"/>
+    </dgm:fillClrLst>
+    <dgm:linClrLst meth="repeat">
+      <a:schemeClr val="lt1"/>
+    </dgm:linClrLst>
+    <dgm:effectClrLst/>
+    <dgm:txLinClrLst/>
+    <dgm:txFillClrLst/>
+    <dgm:txEffectClrLst/>
+  </dgm:styleLbl>
+  <dgm:styleLbl name="fgImgPlace1">
+    <dgm:fillClrLst meth="repeat">
+      <a:schemeClr val="accent1">
+        <a:tint val="50000"/>
+      </a:schemeClr>
+    </dgm:fillClrLst>
+    <dgm:linClrLst meth="repeat">
+      <a:schemeClr val="lt1"/>
+    </dgm:linClrLst>
+    <dgm:effectClrLst/>
+    <dgm:txLinClrLst/>
+    <dgm:txFillClrLst meth="repeat">
+      <a:schemeClr val="lt1"/>
+    </dgm:txFillClrLst>
+    <dgm:txEffectClrLst/>
+  </dgm:styleLbl>
+  <dgm:styleLbl name="alignImgPlace1">
+    <dgm:fillClrLst meth="repeat">
+      <a:schemeClr val="accent1">
+        <a:tint val="50000"/>
+      </a:schemeClr>
+    </dgm:fillClrLst>
+    <dgm:linClrLst meth="repeat">
+      <a:schemeClr val="lt1"/>
+    </dgm:linClrLst>
+    <dgm:effectClrLst/>
+    <dgm:txLinClrLst/>
+    <dgm:txFillClrLst meth="repeat">
+      <a:schemeClr val="lt1"/>
+    </dgm:txFillClrLst>
+    <dgm:txEffectClrLst/>
+  </dgm:styleLbl>
+  <dgm:styleLbl name="bgImgPlace1">
+    <dgm:fillClrLst meth="repeat">
+      <a:schemeClr val="accent1">
+        <a:tint val="50000"/>
+      </a:schemeClr>
+    </dgm:fillClrLst>
+    <dgm:linClrLst meth="repeat">
+      <a:schemeClr val="lt1"/>
+    </dgm:linClrLst>
+    <dgm:effectClrLst/>
+    <dgm:txLinClrLst/>
+    <dgm:txFillClrLst meth="repeat">
+      <a:schemeClr val="lt1"/>
+    </dgm:txFillClrLst>
+    <dgm:txEffectClrLst/>
+  </dgm:styleLbl>
+  <dgm:styleLbl name="sibTrans2D1">
+    <dgm:fillClrLst meth="repeat">
+      <a:schemeClr val="accent1">
+        <a:tint val="60000"/>
+      </a:schemeClr>
+    </dgm:fillClrLst>
+    <dgm:linClrLst meth="repeat">
+      <a:schemeClr val="accent1">
+        <a:tint val="60000"/>
+      </a:schemeClr>
+    </dgm:linClrLst>
+    <dgm:effectClrLst/>
+    <dgm:txLinClrLst/>
+    <dgm:txFillClrLst/>
+    <dgm:txEffectClrLst/>
+  </dgm:styleLbl>
+  <dgm:styleLbl name="fgSibTrans2D1">
+    <dgm:fillClrLst meth="repeat">
+      <a:schemeClr val="accent1">
+        <a:tint val="60000"/>
+      </a:schemeClr>
+    </dgm:fillClrLst>
+    <dgm:linClrLst meth="repeat">
+      <a:schemeClr val="accent1">
+        <a:tint val="60000"/>
+      </a:schemeClr>
+    </dgm:linClrLst>
+    <dgm:effectClrLst/>
+    <dgm:txLinClrLst/>
+    <dgm:txFillClrLst/>
+    <dgm:txEffectClrLst/>
+  </dgm:styleLbl>
+  <dgm:styleLbl name="bgSibTrans2D1">
+    <dgm:fillClrLst meth="repeat">
+      <a:schemeClr val="accent1">
+        <a:tint val="60000"/>
+      </a:schemeClr>
+    </dgm:fillClrLst>
+    <dgm:linClrLst meth="repeat">
+      <a:schemeClr val="accent1">
+        <a:tint val="60000"/>
+      </a:schemeClr>
+    </dgm:linClrLst>
+    <dgm:effectClrLst/>
+    <dgm:txLinClrLst/>
+    <dgm:txFillClrLst/>
+    <dgm:txEffectClrLst/>
+  </dgm:styleLbl>
+  <dgm:styleLbl name="sibTrans1D1">
+    <dgm:fillClrLst meth="repeat">
+      <a:schemeClr val="accent1"/>
+    </dgm:fillClrLst>
+    <dgm:linClrLst meth="repeat">
+      <a:schemeClr val="accent1"/>
+    </dgm:linClrLst>
+    <dgm:effectClrLst/>
+    <dgm:txLinClrLst/>
+    <dgm:txFillClrLst meth="repeat">
+      <a:schemeClr val="tx1"/>
+    </dgm:txFillClrLst>
+    <dgm:txEffectClrLst/>
+  </dgm:styleLbl>
+  <dgm:styleLbl name="callout">
+    <dgm:fillClrLst meth="repeat">
+      <a:schemeClr val="accent1"/>
+    </dgm:fillClrLst>
+    <dgm:linClrLst meth="repeat">
+      <a:schemeClr val="accent1">
+        <a:tint val="50000"/>
+      </a:schemeClr>
+    </dgm:linClrLst>
+    <dgm:effectClrLst/>
+    <dgm:txLinClrLst/>
+    <dgm:txFillClrLst meth="repeat">
+      <a:schemeClr val="tx1"/>
+    </dgm:txFillClrLst>
+    <dgm:txEffectClrLst/>
+  </dgm:styleLbl>
+  <dgm:styleLbl name="asst0">
+    <dgm:fillClrLst meth="repeat">
+      <a:schemeClr val="accent1"/>
+    </dgm:fillClrLst>
+    <dgm:linClrLst meth="repeat">
+      <a:schemeClr val="lt1"/>
+    </dgm:linClrLst>
+    <dgm:effectClrLst/>
+    <dgm:txLinClrLst/>
+    <dgm:txFillClrLst/>
+    <dgm:txEffectClrLst/>
+  </dgm:styleLbl>
+  <dgm:styleLbl name="asst1">
+    <dgm:fillClrLst meth="repeat">
+      <a:schemeClr val="accent1"/>
+    </dgm:fillClrLst>
+    <dgm:linClrLst meth="repeat">
+      <a:schemeClr val="lt1"/>
+    </dgm:linClrLst>
+    <dgm:effectClrLst/>
+    <dgm:txLinClrLst/>
+    <dgm:txFillClrLst/>
+    <dgm:txEffectClrLst/>
+  </dgm:styleLbl>
+  <dgm:styleLbl name="asst2">
+    <dgm:fillClrLst meth="repeat">
+      <a:schemeClr val="accent1"/>
+    </dgm:fillClrLst>
+    <dgm:linClrLst meth="repeat">
+      <a:schemeClr val="lt1"/>
+    </dgm:linClrLst>
+    <dgm:effectClrLst/>
+    <dgm:txLinClrLst/>
+    <dgm:txFillClrLst/>
+    <dgm:txEffectClrLst/>
+  </dgm:styleLbl>
+  <dgm:styleLbl name="asst3">
+    <dgm:fillClrLst meth="repeat">
+      <a:schemeClr val="accent1"/>
+    </dgm:fillClrLst>
+    <dgm:linClrLst meth="repeat">
+      <a:schemeClr val="lt1"/>
+    </dgm:linClrLst>
+    <dgm:effectClrLst/>
+    <dgm:txLinClrLst/>
+    <dgm:txFillClrLst/>
+    <dgm:txEffectClrLst/>
+  </dgm:styleLbl>
+  <dgm:styleLbl name="asst4">
+    <dgm:fillClrLst meth="repeat">
+      <a:schemeClr val="accent1"/>
+    </dgm:fillClrLst>
+    <dgm:linClrLst meth="repeat">
+      <a:schemeClr val="lt1"/>
+    </dgm:linClrLst>
+    <dgm:effectClrLst/>
+    <dgm:txLinClrLst/>
+    <dgm:txFillClrLst/>
+    <dgm:txEffectClrLst/>
+  </dgm:styleLbl>
+  <dgm:styleLbl name="parChTrans2D1">
+    <dgm:fillClrLst meth="repeat">
+      <a:schemeClr val="accent1">
+        <a:tint val="60000"/>
+      </a:schemeClr>
+    </dgm:fillClrLst>
+    <dgm:linClrLst meth="repeat">
+      <a:schemeClr val="accent1">
+        <a:tint val="60000"/>
+      </a:schemeClr>
+    </dgm:linClrLst>
+    <dgm:effectClrLst/>
+    <dgm:txLinClrLst/>
+    <dgm:txFillClrLst meth="repeat">
+      <a:schemeClr val="lt1"/>
+    </dgm:txFillClrLst>
+    <dgm:txEffectClrLst/>
+  </dgm:styleLbl>
+  <dgm:styleLbl name="parChTrans2D2">
+    <dgm:fillClrLst meth="repeat">
+      <a:schemeClr val="accent1"/>
+    </dgm:fillClrLst>
+    <dgm:linClrLst meth="repeat">
+      <a:schemeClr val="accent1"/>
+    </dgm:linClrLst>
+    <dgm:effectClrLst/>
+    <dgm:txLinClrLst/>
+    <dgm:txFillClrLst meth="repeat">
+      <a:schemeClr val="lt1"/>
+    </dgm:txFillClrLst>
+    <dgm:txEffectClrLst/>
+  </dgm:styleLbl>
+  <dgm:styleLbl name="parChTrans2D3">
+    <dgm:fillClrLst meth="repeat">
+      <a:schemeClr val="accent1"/>
+    </dgm:fillClrLst>
+    <dgm:linClrLst meth="repeat">
+      <a:schemeClr val="accent1"/>
+    </dgm:linClrLst>
+    <dgm:effectClrLst/>
+    <dgm:txLinClrLst/>
+    <dgm:txFillClrLst meth="repeat">
+      <a:schemeClr val="lt1"/>
+    </dgm:txFillClrLst>
+    <dgm:txEffectClrLst/>
+  </dgm:styleLbl>
+  <dgm:styleLbl name="parChTrans2D4">
+    <dgm:fillClrLst meth="repeat">
+      <a:schemeClr val="accent1"/>
+    </dgm:fillClrLst>
+    <dgm:linClrLst meth="repeat">
+      <a:schemeClr val="accent1"/>
+    </dgm:linClrLst>
+    <dgm:effectClrLst/>
+    <dgm:txLinClrLst/>
+    <dgm:txFillClrLst meth="repeat">
+      <a:schemeClr val="lt1"/>
+    </dgm:txFillClrLst>
+    <dgm:txEffectClrLst/>
+  </dgm:styleLbl>
+  <dgm:styleLbl name="parChTrans1D1">
+    <dgm:fillClrLst meth="repeat">
+      <a:schemeClr val="accent1"/>
+    </dgm:fillClrLst>
+    <dgm:linClrLst meth="repeat">
+      <a:schemeClr val="accent1">
+        <a:shade val="60000"/>
+      </a:schemeClr>
+    </dgm:linClrLst>
+    <dgm:effectClrLst/>
+    <dgm:txLinClrLst/>
+    <dgm:txFillClrLst meth="repeat">
+      <a:schemeClr val="tx1"/>
+    </dgm:txFillClrLst>
+    <dgm:txEffectClrLst/>
+  </dgm:styleLbl>
+  <dgm:styleLbl name="parChTrans1D2">
+    <dgm:fillClrLst meth="repeat">
+      <a:schemeClr val="accent1"/>
+    </dgm:fillClrLst>
+    <dgm:linClrLst meth="repeat">
+      <a:schemeClr val="accent1">
+        <a:shade val="60000"/>
+      </a:schemeClr>
+    </dgm:linClrLst>
+    <dgm:effectClrLst/>
+    <dgm:txLinClrLst/>
+    <dgm:txFillClrLst meth="repeat">
+      <a:schemeClr val="tx1"/>
+    </dgm:txFillClrLst>
+    <dgm:txEffectClrLst/>
+  </dgm:styleLbl>
+  <dgm:styleLbl name="parChTrans1D3">
+    <dgm:fillClrLst meth="repeat">
+      <a:schemeClr val="accent1"/>
+    </dgm:fillClrLst>
+    <dgm:linClrLst meth="repeat">
+      <a:schemeClr val="accent1">
+        <a:shade val="80000"/>
+      </a:schemeClr>
+    </dgm:linClrLst>
+    <dgm:effectClrLst/>
+    <dgm:txLinClrLst/>
+    <dgm:txFillClrLst meth="repeat">
+      <a:schemeClr val="tx1"/>
+    </dgm:txFillClrLst>
+    <dgm:txEffectClrLst/>
+  </dgm:styleLbl>
+  <dgm:styleLbl name="parChTrans1D4">
+    <dgm:fillClrLst meth="repeat">
+      <a:schemeClr val="accent1"/>
+    </dgm:fillClrLst>
+    <dgm:linClrLst meth="repeat">
+      <a:schemeClr val="accent1">
+        <a:shade val="80000"/>
+      </a:schemeClr>
+    </dgm:linClrLst>
+    <dgm:effectClrLst/>
+    <dgm:txLinClrLst/>
+    <dgm:txFillClrLst meth="repeat">
+      <a:schemeClr val="tx1"/>
+    </dgm:txFillClrLst>
+    <dgm:txEffectClrLst/>
+  </dgm:styleLbl>
+  <dgm:styleLbl name="fgAcc1">
+    <dgm:fillClrLst meth="repeat">
+      <a:schemeClr val="lt1">
+        <a:alpha val="90000"/>
+      </a:schemeClr>
+    </dgm:fillClrLst>
+    <dgm:linClrLst meth="repeat">
+      <a:schemeClr val="accent1"/>
+    </dgm:linClrLst>
+    <dgm:effectClrLst/>
+    <dgm:txLinClrLst/>
+    <dgm:txFillClrLst meth="repeat">
+      <a:schemeClr val="dk1"/>
+    </dgm:txFillClrLst>
+    <dgm:txEffectClrLst/>
+  </dgm:styleLbl>
+  <dgm:styleLbl name="conFgAcc1">
+    <dgm:fillClrLst meth="repeat">
+      <a:schemeClr val="lt1">
+        <a:alpha val="90000"/>
+      </a:schemeClr>
+    </dgm:fillClrLst>
+    <dgm:linClrLst meth="repeat">
+      <a:schemeClr val="accent1"/>
+    </dgm:linClrLst>
+    <dgm:effectClrLst/>
+    <dgm:txLinClrLst/>
+    <dgm:txFillClrLst meth="repeat">
+      <a:schemeClr val="dk1"/>
+    </dgm:txFillClrLst>
+    <dgm:txEffectClrLst/>
+  </dgm:styleLbl>
+  <dgm:styleLbl name="alignAcc1">
+    <dgm:fillClrLst meth="repeat">
+      <a:schemeClr val="lt1">
+        <a:alpha val="90000"/>
+      </a:schemeClr>
+    </dgm:fillClrLst>
+    <dgm:linClrLst meth="repeat">
+      <a:schemeClr val="accent1"/>
+    </dgm:linClrLst>
+    <dgm:effectClrLst/>
+    <dgm:txLinClrLst/>
+    <dgm:txFillClrLst meth="repeat">
+      <a:schemeClr val="dk1"/>
+    </dgm:txFillClrLst>
+    <dgm:txEffectClrLst/>
+  </dgm:styleLbl>
+  <dgm:styleLbl name="trAlignAcc1">
+    <dgm:fillClrLst meth="repeat">
+      <a:schemeClr val="lt1">
+        <a:alpha val="40000"/>
+      </a:schemeClr>
+    </dgm:fillClrLst>
+    <dgm:linClrLst meth="repeat">
+      <a:schemeClr val="accent1"/>
+    </dgm:linClrLst>
+    <dgm:effectClrLst/>
+    <dgm:txLinClrLst/>
+    <dgm:txFillClrLst meth="repeat">
+      <a:schemeClr val="dk1"/>
+    </dgm:txFillClrLst>
+    <dgm:txEffectClrLst/>
+  </dgm:styleLbl>
+  <dgm:styleLbl name="bgAcc1">
+    <dgm:fillClrLst meth="repeat">
+      <a:schemeClr val="lt1">
+        <a:alpha val="90000"/>
+      </a:schemeClr>
+    </dgm:fillClrLst>
+    <dgm:linClrLst meth="repeat">
+      <a:schemeClr val="accent1"/>
+    </dgm:linClrLst>
+    <dgm:effectClrLst/>
+    <dgm:txLinClrLst/>
+    <dgm:txFillClrLst meth="repeat">
+      <a:schemeClr val="dk1"/>
+    </dgm:txFillClrLst>
+    <dgm:txEffectClrLst/>
+  </dgm:styleLbl>
+  <dgm:styleLbl name="solidFgAcc1">
+    <dgm:fillClrLst meth="repeat">
+      <a:schemeClr val="lt1"/>
+    </dgm:fillClrLst>
+    <dgm:linClrLst meth="repeat">
+      <a:schemeClr val="accent1"/>
+    </dgm:linClrLst>
+    <dgm:effectClrLst/>
+    <dgm:txLinClrLst/>
+    <dgm:txFillClrLst meth="repeat">
+      <a:schemeClr val="dk1"/>
+    </dgm:txFillClrLst>
+    <dgm:txEffectClrLst/>
+  </dgm:styleLbl>
+  <dgm:styleLbl name="solidAlignAcc1">
+    <dgm:fillClrLst meth="repeat">
+      <a:schemeClr val="lt1"/>
+    </dgm:fillClrLst>
+    <dgm:linClrLst meth="repeat">
+      <a:schemeClr val="accent1"/>
+    </dgm:linClrLst>
+    <dgm:effectClrLst/>
+    <dgm:txLinClrLst/>
+    <dgm:txFillClrLst meth="repeat">
+      <a:schemeClr val="dk1"/>
+    </dgm:txFillClrLst>
+    <dgm:txEffectClrLst/>
+  </dgm:styleLbl>
+  <dgm:styleLbl name="solidBgAcc1">
+    <dgm:fillClrLst meth="repeat">
+      <a:schemeClr val="lt1"/>
+    </dgm:fillClrLst>
+    <dgm:linClrLst meth="repeat">
+      <a:schemeClr val="accent1"/>
+    </dgm:linClrLst>
+    <dgm:effectClrLst/>
+    <dgm:txLinClrLst/>
+    <dgm:txFillClrLst meth="repeat">
+      <a:schemeClr val="dk1"/>
+    </dgm:txFillClrLst>
+    <dgm:txEffectClrLst/>
+  </dgm:styleLbl>
+  <dgm:styleLbl name="fgAccFollowNode1">
+    <dgm:fillClrLst meth="repeat">
+      <a:schemeClr val="accent1">
+        <a:alpha val="90000"/>
+        <a:tint val="40000"/>
+      </a:schemeClr>
+    </dgm:fillClrLst>
+    <dgm:linClrLst meth="repeat">
+      <a:schemeClr val="accent1">
+        <a:alpha val="90000"/>
+        <a:tint val="40000"/>
+      </a:schemeClr>
+    </dgm:linClrLst>
+    <dgm:effectClrLst/>
+    <dgm:txLinClrLst/>
+    <dgm:txFillClrLst meth="repeat">
+      <a:schemeClr val="dk1"/>
+    </dgm:txFillClrLst>
+    <dgm:txEffectClrLst/>
+  </dgm:styleLbl>
+  <dgm:styleLbl name="alignAccFollowNode1">
+    <dgm:fillClrLst meth="repeat">
+      <a:schemeClr val="accent1">
+        <a:alpha val="90000"/>
+        <a:tint val="40000"/>
+      </a:schemeClr>
+    </dgm:fillClrLst>
+    <dgm:linClrLst meth="repeat">
+      <a:schemeClr val="accent1">
+        <a:alpha val="90000"/>
+        <a:tint val="40000"/>
+      </a:schemeClr>
+    </dgm:linClrLst>
+    <dgm:effectClrLst/>
+    <dgm:txLinClrLst/>
+    <dgm:txFillClrLst meth="repeat">
+      <a:schemeClr val="dk1"/>
+    </dgm:txFillClrLst>
+    <dgm:txEffectClrLst/>
+  </dgm:styleLbl>
+  <dgm:styleLbl name="bgAccFollowNode1">
+    <dgm:fillClrLst meth="repeat">
+      <a:schemeClr val="accent1">
+        <a:alpha val="90000"/>
+        <a:tint val="40000"/>
+      </a:schemeClr>
+    </dgm:fillClrLst>
+    <dgm:linClrLst meth="repeat">
+      <a:schemeClr val="accent1">
+        <a:alpha val="90000"/>
+        <a:tint val="40000"/>
+      </a:schemeClr>
+    </dgm:linClrLst>
+    <dgm:effectClrLst/>
+    <dgm:txLinClrLst/>
+    <dgm:txFillClrLst meth="repeat">
+      <a:schemeClr val="dk1"/>
+    </dgm:txFillClrLst>
+    <dgm:txEffectClrLst/>
+  </dgm:styleLbl>
+  <dgm:styleLbl name="fgAcc0">
+    <dgm:fillClrLst meth="repeat">
+      <a:schemeClr val="lt1">
+        <a:alpha val="90000"/>
+      </a:schemeClr>
+    </dgm:fillClrLst>
+    <dgm:linClrLst meth="repeat">
+      <a:schemeClr val="accent1"/>
+    </dgm:linClrLst>
+    <dgm:effectClrLst/>
+    <dgm:txLinClrLst/>
+    <dgm:txFillClrLst meth="repeat">
+      <a:schemeClr val="dk1"/>
+    </dgm:txFillClrLst>
+    <dgm:txEffectClrLst/>
+  </dgm:styleLbl>
+  <dgm:styleLbl name="fgAcc2">
+    <dgm:fillClrLst meth="repeat">
+      <a:schemeClr val="lt1">
+        <a:alpha val="90000"/>
+      </a:schemeClr>
+    </dgm:fillClrLst>
+    <dgm:linClrLst meth="repeat">
+      <a:schemeClr val="accent1"/>
+    </dgm:linClrLst>
+    <dgm:effectClrLst/>
+    <dgm:txLinClrLst/>
+    <dgm:txFillClrLst meth="repeat">
+      <a:schemeClr val="dk1"/>
+    </dgm:txFillClrLst>
+    <dgm:txEffectClrLst/>
+  </dgm:styleLbl>
+  <dgm:styleLbl name="fgAcc3">
+    <dgm:fillClrLst meth="repeat">
+      <a:schemeClr val="lt1">
+        <a:alpha val="90000"/>
+      </a:schemeClr>
+    </dgm:fillClrLst>
+    <dgm:linClrLst meth="repeat">
+      <a:schemeClr val="accent1"/>
+    </dgm:linClrLst>
+    <dgm:effectClrLst/>
+    <dgm:txLinClrLst/>
+    <dgm:txFillClrLst meth="repeat">
+      <a:schemeClr val="dk1"/>
+    </dgm:txFillClrLst>
+    <dgm:txEffectClrLst/>
+  </dgm:styleLbl>
+  <dgm:styleLbl name="fgAcc4">
+    <dgm:fillClrLst meth="repeat">
+      <a:schemeClr val="lt1">
+        <a:alpha val="90000"/>
+      </a:schemeClr>
+    </dgm:fillClrLst>
+    <dgm:linClrLst meth="repeat">
+      <a:schemeClr val="accent1"/>
+    </dgm:linClrLst>
+    <dgm:effectClrLst/>
+    <dgm:txLinClrLst/>
+    <dgm:txFillClrLst meth="repeat">
+      <a:schemeClr val="dk1"/>
+    </dgm:txFillClrLst>
+    <dgm:txEffectClrLst/>
+  </dgm:styleLbl>
+  <dgm:styleLbl name="bgShp">
+    <dgm:fillClrLst meth="repeat">
+      <a:schemeClr val="accent1">
+        <a:tint val="40000"/>
+      </a:schemeClr>
+    </dgm:fillClrLst>
+    <dgm:linClrLst meth="repeat">
+      <a:schemeClr val="accent1"/>
+    </dgm:linClrLst>
+    <dgm:effectClrLst/>
+    <dgm:txLinClrLst/>
+    <dgm:txFillClrLst meth="repeat">
+      <a:schemeClr val="dk1"/>
+    </dgm:txFillClrLst>
+    <dgm:txEffectClrLst/>
+  </dgm:styleLbl>
+  <dgm:styleLbl name="dkBgShp">
+    <dgm:fillClrLst meth="repeat">
+      <a:schemeClr val="accent1">
+        <a:shade val="80000"/>
+      </a:schemeClr>
+    </dgm:fillClrLst>
+    <dgm:linClrLst meth="repeat">
+      <a:schemeClr val="accent1"/>
+    </dgm:linClrLst>
+    <dgm:effectClrLst/>
+    <dgm:txLinClrLst/>
+    <dgm:txFillClrLst meth="repeat">
+      <a:schemeClr val="lt1"/>
+    </dgm:txFillClrLst>
+    <dgm:txEffectClrLst/>
+  </dgm:styleLbl>
+  <dgm:styleLbl name="trBgShp">
+    <dgm:fillClrLst meth="repeat">
+      <a:schemeClr val="accent1">
+        <a:tint val="50000"/>
+        <a:alpha val="40000"/>
+      </a:schemeClr>
+    </dgm:fillClrLst>
+    <dgm:linClrLst meth="repeat">
+      <a:schemeClr val="accent1"/>
+    </dgm:linClrLst>
+    <dgm:effectClrLst/>
+    <dgm:txLinClrLst/>
+    <dgm:txFillClrLst meth="repeat">
+      <a:schemeClr val="lt1"/>
+    </dgm:txFillClrLst>
+    <dgm:txEffectClrLst/>
+  </dgm:styleLbl>
+  <dgm:styleLbl name="fgShp">
+    <dgm:fillClrLst meth="repeat">
+      <a:schemeClr val="accent1">
+        <a:tint val="60000"/>
+      </a:schemeClr>
+    </dgm:fillClrLst>
+    <dgm:linClrLst meth="repeat">
+      <a:schemeClr val="lt1"/>
+    </dgm:linClrLst>
+    <dgm:effectClrLst/>
+    <dgm:txLinClrLst/>
+    <dgm:txFillClrLst meth="repeat">
+      <a:schemeClr val="dk1"/>
+    </dgm:txFillClrLst>
+    <dgm:txEffectClrLst/>
+  </dgm:styleLbl>
+  <dgm:styleLbl name="revTx">
+    <dgm:fillClrLst meth="repeat">
+      <a:schemeClr val="lt1">
+        <a:alpha val="0"/>
+      </a:schemeClr>
+    </dgm:fillClrLst>
+    <dgm:linClrLst meth="repeat">
+      <a:schemeClr val="dk1">
+        <a:alpha val="0"/>
+      </a:schemeClr>
+    </dgm:linClrLst>
+    <dgm:effectClrLst/>
+    <dgm:txLinClrLst/>
+    <dgm:txFillClrLst meth="repeat">
+      <a:schemeClr val="tx1"/>
+    </dgm:txFillClrLst>
+    <dgm:txEffectClrLst/>
+  </dgm:styleLbl>
+</dgm:colorsDef>
+</file>
+
+<file path=ppt/diagrams/data1.xml><?xml version="1.0" encoding="utf-8"?>
+<dgm:dataModel xmlns:dgm="http://schemas.openxmlformats.org/drawingml/2006/diagram" xmlns:a="http://schemas.openxmlformats.org/drawingml/2006/main">
+  <dgm:ptLst>
+    <dgm:pt modelId="{00CEEF6D-A32C-4EAC-828B-FD49B916AD6A}" type="doc">
+      <dgm:prSet loTypeId="urn:microsoft.com/office/officeart/2005/8/layout/pyramid2" loCatId="pyramid" qsTypeId="urn:microsoft.com/office/officeart/2005/8/quickstyle/simple1" qsCatId="simple" csTypeId="urn:microsoft.com/office/officeart/2005/8/colors/accent1_2" csCatId="accent1" phldr="1"/>
+      <dgm:spPr/>
+    </dgm:pt>
+    <dgm:pt modelId="{B2210F50-F351-44F1-9CAB-868947338B5A}">
+      <dgm:prSet phldrT="[Text]"/>
+      <dgm:spPr/>
+      <dgm:t>
+        <a:bodyPr/>
+        <a:lstStyle/>
+        <a:p>
+          <a:r>
+            <a:rPr lang="en-US" dirty="0"/>
+            <a:t>Analytics Platform: Spark, Hadoop</a:t>
+          </a:r>
+        </a:p>
+      </dgm:t>
+    </dgm:pt>
+    <dgm:pt modelId="{6FF1AAD0-113F-43F2-90CA-21BE0BA72E90}" type="parTrans" cxnId="{6D683554-31D0-417F-8C05-9405820B2217}">
+      <dgm:prSet/>
+      <dgm:spPr/>
+      <dgm:t>
+        <a:bodyPr/>
+        <a:lstStyle/>
+        <a:p>
+          <a:endParaRPr lang="en-US"/>
+        </a:p>
+      </dgm:t>
+    </dgm:pt>
+    <dgm:pt modelId="{782D377B-1577-4296-A85E-CE61F4F8DE89}" type="sibTrans" cxnId="{6D683554-31D0-417F-8C05-9405820B2217}">
+      <dgm:prSet/>
+      <dgm:spPr/>
+      <dgm:t>
+        <a:bodyPr/>
+        <a:lstStyle/>
+        <a:p>
+          <a:endParaRPr lang="en-US"/>
+        </a:p>
+      </dgm:t>
+    </dgm:pt>
+    <dgm:pt modelId="{A3AF30F0-5DB8-4660-8543-AFC7D89227CB}">
+      <dgm:prSet phldrT="[Text]"/>
+      <dgm:spPr/>
+      <dgm:t>
+        <a:bodyPr/>
+        <a:lstStyle/>
+        <a:p>
+          <a:r>
+            <a:rPr lang="en-US" dirty="0"/>
+            <a:t>Data Migration: </a:t>
+          </a:r>
+          <a:r>
+            <a:rPr lang="en-US" dirty="0" err="1"/>
+            <a:t>Sqoop</a:t>
+          </a:r>
+          <a:r>
+            <a:rPr lang="en-US" dirty="0"/>
+            <a:t>, Flume, Kafka</a:t>
+          </a:r>
+        </a:p>
+      </dgm:t>
+    </dgm:pt>
+    <dgm:pt modelId="{6543C27A-B696-4CFF-9B99-86D16FA6A5A9}" type="parTrans" cxnId="{02BF8078-878E-4DFA-B433-EAE487179EE3}">
+      <dgm:prSet/>
+      <dgm:spPr/>
+      <dgm:t>
+        <a:bodyPr/>
+        <a:lstStyle/>
+        <a:p>
+          <a:endParaRPr lang="en-US"/>
+        </a:p>
+      </dgm:t>
+    </dgm:pt>
+    <dgm:pt modelId="{8108FD6E-8A53-4110-81CA-565C9DD566EF}" type="sibTrans" cxnId="{02BF8078-878E-4DFA-B433-EAE487179EE3}">
+      <dgm:prSet/>
+      <dgm:spPr/>
+      <dgm:t>
+        <a:bodyPr/>
+        <a:lstStyle/>
+        <a:p>
+          <a:endParaRPr lang="en-US"/>
+        </a:p>
+      </dgm:t>
+    </dgm:pt>
+    <dgm:pt modelId="{08993F9A-0CC3-44B4-8892-EFE9C0308AD7}">
+      <dgm:prSet phldrT="[Text]"/>
+      <dgm:spPr/>
+      <dgm:t>
+        <a:bodyPr/>
+        <a:lstStyle/>
+        <a:p>
+          <a:r>
+            <a:rPr lang="en-US" dirty="0"/>
+            <a:t>Database: MySQL</a:t>
+          </a:r>
+        </a:p>
+      </dgm:t>
+    </dgm:pt>
+    <dgm:pt modelId="{8D80115C-4B10-48DF-B67F-FBA1946A82D7}" type="parTrans" cxnId="{DC16170B-5CC3-44A8-9BFB-D16B897D2751}">
+      <dgm:prSet/>
+      <dgm:spPr/>
+      <dgm:t>
+        <a:bodyPr/>
+        <a:lstStyle/>
+        <a:p>
+          <a:endParaRPr lang="en-US"/>
+        </a:p>
+      </dgm:t>
+    </dgm:pt>
+    <dgm:pt modelId="{4253A01B-FC5D-4AAD-B8A7-34DAA5F1E855}" type="sibTrans" cxnId="{DC16170B-5CC3-44A8-9BFB-D16B897D2751}">
+      <dgm:prSet/>
+      <dgm:spPr/>
+      <dgm:t>
+        <a:bodyPr/>
+        <a:lstStyle/>
+        <a:p>
+          <a:endParaRPr lang="en-US"/>
+        </a:p>
+      </dgm:t>
+    </dgm:pt>
+    <dgm:pt modelId="{23659D8E-1B17-4F6D-8A62-74BEC81A9184}">
+      <dgm:prSet phldrT="[Text]"/>
+      <dgm:spPr/>
+      <dgm:t>
+        <a:bodyPr/>
+        <a:lstStyle/>
+        <a:p>
+          <a:r>
+            <a:rPr lang="en-US" dirty="0"/>
+            <a:t>User Application: AngularJS, Java</a:t>
+          </a:r>
+        </a:p>
+      </dgm:t>
+    </dgm:pt>
+    <dgm:pt modelId="{6F0349D6-3884-40D7-BCD7-4B74FAC3B728}" type="parTrans" cxnId="{F0EAB915-1FE3-495D-BC0E-F7D144CC74DF}">
+      <dgm:prSet/>
+      <dgm:spPr/>
+      <dgm:t>
+        <a:bodyPr/>
+        <a:lstStyle/>
+        <a:p>
+          <a:endParaRPr lang="en-US"/>
+        </a:p>
+      </dgm:t>
+    </dgm:pt>
+    <dgm:pt modelId="{56CB0203-31A1-4851-8E76-F2C5A01338E1}" type="sibTrans" cxnId="{F0EAB915-1FE3-495D-BC0E-F7D144CC74DF}">
+      <dgm:prSet/>
+      <dgm:spPr/>
+      <dgm:t>
+        <a:bodyPr/>
+        <a:lstStyle/>
+        <a:p>
+          <a:endParaRPr lang="en-US"/>
+        </a:p>
+      </dgm:t>
+    </dgm:pt>
+    <dgm:pt modelId="{68200F8E-005D-4554-8545-5E20F20A12CD}" type="pres">
+      <dgm:prSet presAssocID="{00CEEF6D-A32C-4EAC-828B-FD49B916AD6A}" presName="compositeShape" presStyleCnt="0">
+        <dgm:presLayoutVars>
+          <dgm:dir/>
+          <dgm:resizeHandles/>
+        </dgm:presLayoutVars>
+      </dgm:prSet>
+      <dgm:spPr/>
+    </dgm:pt>
+    <dgm:pt modelId="{24465388-EDA9-48F1-949F-9DD7BE7336E5}" type="pres">
+      <dgm:prSet presAssocID="{00CEEF6D-A32C-4EAC-828B-FD49B916AD6A}" presName="pyramid" presStyleLbl="node1" presStyleIdx="0" presStyleCnt="1"/>
+      <dgm:spPr/>
+    </dgm:pt>
+    <dgm:pt modelId="{E84CEE8D-869F-4389-B1D9-20FDB253A69A}" type="pres">
+      <dgm:prSet presAssocID="{00CEEF6D-A32C-4EAC-828B-FD49B916AD6A}" presName="theList" presStyleCnt="0"/>
+      <dgm:spPr/>
+    </dgm:pt>
+    <dgm:pt modelId="{83868E7C-3E3D-4DDB-8337-35FD07E85FD0}" type="pres">
+      <dgm:prSet presAssocID="{23659D8E-1B17-4F6D-8A62-74BEC81A9184}" presName="aNode" presStyleLbl="fgAcc1" presStyleIdx="0" presStyleCnt="4">
+        <dgm:presLayoutVars>
+          <dgm:bulletEnabled val="1"/>
+        </dgm:presLayoutVars>
+      </dgm:prSet>
+      <dgm:spPr/>
+    </dgm:pt>
+    <dgm:pt modelId="{DA82800E-6053-4B3E-90F1-D0F5E326A6E5}" type="pres">
+      <dgm:prSet presAssocID="{23659D8E-1B17-4F6D-8A62-74BEC81A9184}" presName="aSpace" presStyleCnt="0"/>
+      <dgm:spPr/>
+    </dgm:pt>
+    <dgm:pt modelId="{8C782915-8560-4384-85BA-598745030ADE}" type="pres">
+      <dgm:prSet presAssocID="{B2210F50-F351-44F1-9CAB-868947338B5A}" presName="aNode" presStyleLbl="fgAcc1" presStyleIdx="1" presStyleCnt="4">
+        <dgm:presLayoutVars>
+          <dgm:bulletEnabled val="1"/>
+        </dgm:presLayoutVars>
+      </dgm:prSet>
+      <dgm:spPr/>
+    </dgm:pt>
+    <dgm:pt modelId="{22DD69FE-D3EC-4B20-8F4D-E4EDB2F8675D}" type="pres">
+      <dgm:prSet presAssocID="{B2210F50-F351-44F1-9CAB-868947338B5A}" presName="aSpace" presStyleCnt="0"/>
+      <dgm:spPr/>
+    </dgm:pt>
+    <dgm:pt modelId="{14629C5F-6C08-4B29-882C-19088B064A82}" type="pres">
+      <dgm:prSet presAssocID="{A3AF30F0-5DB8-4660-8543-AFC7D89227CB}" presName="aNode" presStyleLbl="fgAcc1" presStyleIdx="2" presStyleCnt="4">
+        <dgm:presLayoutVars>
+          <dgm:bulletEnabled val="1"/>
+        </dgm:presLayoutVars>
+      </dgm:prSet>
+      <dgm:spPr/>
+    </dgm:pt>
+    <dgm:pt modelId="{3DC14A5E-4DE4-47C7-8E8F-483ADB2BEAAE}" type="pres">
+      <dgm:prSet presAssocID="{A3AF30F0-5DB8-4660-8543-AFC7D89227CB}" presName="aSpace" presStyleCnt="0"/>
+      <dgm:spPr/>
+    </dgm:pt>
+    <dgm:pt modelId="{FDC6A411-E160-41F8-98E2-AC97E3A31524}" type="pres">
+      <dgm:prSet presAssocID="{08993F9A-0CC3-44B4-8892-EFE9C0308AD7}" presName="aNode" presStyleLbl="fgAcc1" presStyleIdx="3" presStyleCnt="4">
+        <dgm:presLayoutVars>
+          <dgm:bulletEnabled val="1"/>
+        </dgm:presLayoutVars>
+      </dgm:prSet>
+      <dgm:spPr/>
+    </dgm:pt>
+    <dgm:pt modelId="{3112179E-9DA8-4D9D-A09F-7DD2FED2D1C7}" type="pres">
+      <dgm:prSet presAssocID="{08993F9A-0CC3-44B4-8892-EFE9C0308AD7}" presName="aSpace" presStyleCnt="0"/>
+      <dgm:spPr/>
+    </dgm:pt>
+  </dgm:ptLst>
+  <dgm:cxnLst>
+    <dgm:cxn modelId="{DC16170B-5CC3-44A8-9BFB-D16B897D2751}" srcId="{00CEEF6D-A32C-4EAC-828B-FD49B916AD6A}" destId="{08993F9A-0CC3-44B4-8892-EFE9C0308AD7}" srcOrd="3" destOrd="0" parTransId="{8D80115C-4B10-48DF-B67F-FBA1946A82D7}" sibTransId="{4253A01B-FC5D-4AAD-B8A7-34DAA5F1E855}"/>
+    <dgm:cxn modelId="{F0EAB915-1FE3-495D-BC0E-F7D144CC74DF}" srcId="{00CEEF6D-A32C-4EAC-828B-FD49B916AD6A}" destId="{23659D8E-1B17-4F6D-8A62-74BEC81A9184}" srcOrd="0" destOrd="0" parTransId="{6F0349D6-3884-40D7-BCD7-4B74FAC3B728}" sibTransId="{56CB0203-31A1-4851-8E76-F2C5A01338E1}"/>
+    <dgm:cxn modelId="{AD210264-4FC4-4C93-909E-6F4A657B4990}" type="presOf" srcId="{08993F9A-0CC3-44B4-8892-EFE9C0308AD7}" destId="{FDC6A411-E160-41F8-98E2-AC97E3A31524}" srcOrd="0" destOrd="0" presId="urn:microsoft.com/office/officeart/2005/8/layout/pyramid2"/>
+    <dgm:cxn modelId="{6D683554-31D0-417F-8C05-9405820B2217}" srcId="{00CEEF6D-A32C-4EAC-828B-FD49B916AD6A}" destId="{B2210F50-F351-44F1-9CAB-868947338B5A}" srcOrd="1" destOrd="0" parTransId="{6FF1AAD0-113F-43F2-90CA-21BE0BA72E90}" sibTransId="{782D377B-1577-4296-A85E-CE61F4F8DE89}"/>
+    <dgm:cxn modelId="{B420A754-DF38-4CD9-BB61-404AB790BEF5}" type="presOf" srcId="{B2210F50-F351-44F1-9CAB-868947338B5A}" destId="{8C782915-8560-4384-85BA-598745030ADE}" srcOrd="0" destOrd="0" presId="urn:microsoft.com/office/officeart/2005/8/layout/pyramid2"/>
+    <dgm:cxn modelId="{254DD874-7194-48FC-BC16-2E420D4F2F42}" type="presOf" srcId="{00CEEF6D-A32C-4EAC-828B-FD49B916AD6A}" destId="{68200F8E-005D-4554-8545-5E20F20A12CD}" srcOrd="0" destOrd="0" presId="urn:microsoft.com/office/officeart/2005/8/layout/pyramid2"/>
+    <dgm:cxn modelId="{02BF8078-878E-4DFA-B433-EAE487179EE3}" srcId="{00CEEF6D-A32C-4EAC-828B-FD49B916AD6A}" destId="{A3AF30F0-5DB8-4660-8543-AFC7D89227CB}" srcOrd="2" destOrd="0" parTransId="{6543C27A-B696-4CFF-9B99-86D16FA6A5A9}" sibTransId="{8108FD6E-8A53-4110-81CA-565C9DD566EF}"/>
+    <dgm:cxn modelId="{DFD089D4-1902-4EB7-B5E0-62ABDB5E327A}" type="presOf" srcId="{A3AF30F0-5DB8-4660-8543-AFC7D89227CB}" destId="{14629C5F-6C08-4B29-882C-19088B064A82}" srcOrd="0" destOrd="0" presId="urn:microsoft.com/office/officeart/2005/8/layout/pyramid2"/>
+    <dgm:cxn modelId="{A7D2E0EE-E737-4DD3-A8D7-806D31CAA9D3}" type="presOf" srcId="{23659D8E-1B17-4F6D-8A62-74BEC81A9184}" destId="{83868E7C-3E3D-4DDB-8337-35FD07E85FD0}" srcOrd="0" destOrd="0" presId="urn:microsoft.com/office/officeart/2005/8/layout/pyramid2"/>
+    <dgm:cxn modelId="{8A0EFDBE-8278-4249-A1CA-1BDEC97EA7B9}" type="presParOf" srcId="{68200F8E-005D-4554-8545-5E20F20A12CD}" destId="{24465388-EDA9-48F1-949F-9DD7BE7336E5}" srcOrd="0" destOrd="0" presId="urn:microsoft.com/office/officeart/2005/8/layout/pyramid2"/>
+    <dgm:cxn modelId="{F0B781C3-8286-43DC-8F5D-0FA62B5225D2}" type="presParOf" srcId="{68200F8E-005D-4554-8545-5E20F20A12CD}" destId="{E84CEE8D-869F-4389-B1D9-20FDB253A69A}" srcOrd="1" destOrd="0" presId="urn:microsoft.com/office/officeart/2005/8/layout/pyramid2"/>
+    <dgm:cxn modelId="{33FF5952-2EC5-4A49-AC90-1B3C7211A60C}" type="presParOf" srcId="{E84CEE8D-869F-4389-B1D9-20FDB253A69A}" destId="{83868E7C-3E3D-4DDB-8337-35FD07E85FD0}" srcOrd="0" destOrd="0" presId="urn:microsoft.com/office/officeart/2005/8/layout/pyramid2"/>
+    <dgm:cxn modelId="{6ED9D172-3CA1-42D8-9C26-77A1539431C0}" type="presParOf" srcId="{E84CEE8D-869F-4389-B1D9-20FDB253A69A}" destId="{DA82800E-6053-4B3E-90F1-D0F5E326A6E5}" srcOrd="1" destOrd="0" presId="urn:microsoft.com/office/officeart/2005/8/layout/pyramid2"/>
+    <dgm:cxn modelId="{B210AEC0-E084-4949-9AD2-2E3652E742BB}" type="presParOf" srcId="{E84CEE8D-869F-4389-B1D9-20FDB253A69A}" destId="{8C782915-8560-4384-85BA-598745030ADE}" srcOrd="2" destOrd="0" presId="urn:microsoft.com/office/officeart/2005/8/layout/pyramid2"/>
+    <dgm:cxn modelId="{0F0783E5-34C4-4156-90A3-C8A301055616}" type="presParOf" srcId="{E84CEE8D-869F-4389-B1D9-20FDB253A69A}" destId="{22DD69FE-D3EC-4B20-8F4D-E4EDB2F8675D}" srcOrd="3" destOrd="0" presId="urn:microsoft.com/office/officeart/2005/8/layout/pyramid2"/>
+    <dgm:cxn modelId="{3EECDCFC-846E-4FC6-907F-440D40CD851C}" type="presParOf" srcId="{E84CEE8D-869F-4389-B1D9-20FDB253A69A}" destId="{14629C5F-6C08-4B29-882C-19088B064A82}" srcOrd="4" destOrd="0" presId="urn:microsoft.com/office/officeart/2005/8/layout/pyramid2"/>
+    <dgm:cxn modelId="{DA46AC0F-8E35-4CA5-B3A1-245F4ABBA52E}" type="presParOf" srcId="{E84CEE8D-869F-4389-B1D9-20FDB253A69A}" destId="{3DC14A5E-4DE4-47C7-8E8F-483ADB2BEAAE}" srcOrd="5" destOrd="0" presId="urn:microsoft.com/office/officeart/2005/8/layout/pyramid2"/>
+    <dgm:cxn modelId="{310500C2-0AB7-471F-84F8-B991A0D459DE}" type="presParOf" srcId="{E84CEE8D-869F-4389-B1D9-20FDB253A69A}" destId="{FDC6A411-E160-41F8-98E2-AC97E3A31524}" srcOrd="6" destOrd="0" presId="urn:microsoft.com/office/officeart/2005/8/layout/pyramid2"/>
+    <dgm:cxn modelId="{3DA94D00-46EB-4736-8ED4-788C3E005D8B}" type="presParOf" srcId="{E84CEE8D-869F-4389-B1D9-20FDB253A69A}" destId="{3112179E-9DA8-4D9D-A09F-7DD2FED2D1C7}" srcOrd="7" destOrd="0" presId="urn:microsoft.com/office/officeart/2005/8/layout/pyramid2"/>
+  </dgm:cxnLst>
+  <dgm:bg/>
+  <dgm:whole/>
+  <dgm:extLst>
+    <a:ext uri="http://schemas.microsoft.com/office/drawing/2008/diagram">
+      <dsp:dataModelExt xmlns:dsp="http://schemas.microsoft.com/office/drawing/2008/diagram" relId="rId6" minVer="http://schemas.openxmlformats.org/drawingml/2006/diagram"/>
+    </a:ext>
+  </dgm:extLst>
+</dgm:dataModel>
+</file>
+
+<file path=ppt/diagrams/drawing1.xml><?xml version="1.0" encoding="utf-8"?>
+<dsp:drawing xmlns:dgm="http://schemas.openxmlformats.org/drawingml/2006/diagram" xmlns:dsp="http://schemas.microsoft.com/office/drawing/2008/diagram" xmlns:a="http://schemas.openxmlformats.org/drawingml/2006/main">
+  <dsp:spTree>
+    <dsp:nvGrpSpPr>
+      <dsp:cNvPr id="0" name=""/>
+      <dsp:cNvGrpSpPr/>
+    </dsp:nvGrpSpPr>
+    <dsp:grpSpPr/>
+    <dsp:sp modelId="{24465388-EDA9-48F1-949F-9DD7BE7336E5}">
+      <dsp:nvSpPr>
+        <dsp:cNvPr id="0" name=""/>
+        <dsp:cNvSpPr/>
+      </dsp:nvSpPr>
+      <dsp:spPr>
+        <a:xfrm>
+          <a:off x="948266" y="0"/>
+          <a:ext cx="5418667" cy="5418667"/>
+        </a:xfrm>
+        <a:prstGeom prst="triangle">
+          <a:avLst/>
+        </a:prstGeom>
+        <a:solidFill>
+          <a:schemeClr val="accent1">
+            <a:hueOff val="0"/>
+            <a:satOff val="0"/>
+            <a:lumOff val="0"/>
+            <a:alphaOff val="0"/>
+          </a:schemeClr>
+        </a:solidFill>
+        <a:ln w="12700" cap="flat" cmpd="sng" algn="ctr">
+          <a:solidFill>
+            <a:schemeClr val="lt1">
+              <a:hueOff val="0"/>
+              <a:satOff val="0"/>
+              <a:lumOff val="0"/>
+              <a:alphaOff val="0"/>
+            </a:schemeClr>
+          </a:solidFill>
+          <a:prstDash val="solid"/>
+          <a:miter lim="800000"/>
+        </a:ln>
+        <a:effectLst/>
+      </dsp:spPr>
+      <dsp:style>
+        <a:lnRef idx="2">
+          <a:scrgbClr r="0" g="0" b="0"/>
+        </a:lnRef>
+        <a:fillRef idx="1">
+          <a:scrgbClr r="0" g="0" b="0"/>
+        </a:fillRef>
+        <a:effectRef idx="0">
+          <a:scrgbClr r="0" g="0" b="0"/>
+        </a:effectRef>
+        <a:fontRef idx="minor">
+          <a:schemeClr val="lt1"/>
+        </a:fontRef>
+      </dsp:style>
+    </dsp:sp>
+    <dsp:sp modelId="{83868E7C-3E3D-4DDB-8337-35FD07E85FD0}">
+      <dsp:nvSpPr>
+        <dsp:cNvPr id="0" name=""/>
+        <dsp:cNvSpPr/>
+      </dsp:nvSpPr>
+      <dsp:spPr>
+        <a:xfrm>
+          <a:off x="3657599" y="542395"/>
+          <a:ext cx="3522133" cy="963083"/>
+        </a:xfrm>
+        <a:prstGeom prst="roundRect">
+          <a:avLst/>
+        </a:prstGeom>
+        <a:solidFill>
+          <a:schemeClr val="lt1">
+            <a:alpha val="90000"/>
+            <a:hueOff val="0"/>
+            <a:satOff val="0"/>
+            <a:lumOff val="0"/>
+            <a:alphaOff val="0"/>
+          </a:schemeClr>
+        </a:solidFill>
+        <a:ln w="12700" cap="flat" cmpd="sng" algn="ctr">
+          <a:solidFill>
+            <a:schemeClr val="accent1">
+              <a:hueOff val="0"/>
+              <a:satOff val="0"/>
+              <a:lumOff val="0"/>
+              <a:alphaOff val="0"/>
+            </a:schemeClr>
+          </a:solidFill>
+          <a:prstDash val="solid"/>
+          <a:miter lim="800000"/>
+        </a:ln>
+        <a:effectLst/>
+      </dsp:spPr>
+      <dsp:style>
+        <a:lnRef idx="2">
+          <a:scrgbClr r="0" g="0" b="0"/>
+        </a:lnRef>
+        <a:fillRef idx="1">
+          <a:scrgbClr r="0" g="0" b="0"/>
+        </a:fillRef>
+        <a:effectRef idx="0">
+          <a:scrgbClr r="0" g="0" b="0"/>
+        </a:effectRef>
+        <a:fontRef idx="minor"/>
+      </dsp:style>
+      <dsp:txBody>
+        <a:bodyPr spcFirstLastPara="0" vert="horz" wrap="square" lIns="91440" tIns="91440" rIns="91440" bIns="91440" numCol="1" spcCol="1270" anchor="ctr" anchorCtr="0">
+          <a:noAutofit/>
+        </a:bodyPr>
+        <a:lstStyle/>
+        <a:p>
+          <a:pPr marL="0" lvl="0" indent="0" algn="ctr" defTabSz="1066800">
+            <a:lnSpc>
+              <a:spcPct val="90000"/>
+            </a:lnSpc>
+            <a:spcBef>
+              <a:spcPct val="0"/>
+            </a:spcBef>
+            <a:spcAft>
+              <a:spcPct val="35000"/>
+            </a:spcAft>
+            <a:buNone/>
+          </a:pPr>
+          <a:r>
+            <a:rPr lang="en-US" sz="2400" kern="1200" dirty="0"/>
+            <a:t>User Application: AngularJS, Java</a:t>
+          </a:r>
+        </a:p>
+      </dsp:txBody>
+      <dsp:txXfrm>
+        <a:off x="3704613" y="589409"/>
+        <a:ext cx="3428105" cy="869055"/>
+      </dsp:txXfrm>
+    </dsp:sp>
+    <dsp:sp modelId="{8C782915-8560-4384-85BA-598745030ADE}">
+      <dsp:nvSpPr>
+        <dsp:cNvPr id="0" name=""/>
+        <dsp:cNvSpPr/>
+      </dsp:nvSpPr>
+      <dsp:spPr>
+        <a:xfrm>
+          <a:off x="3657599" y="1625864"/>
+          <a:ext cx="3522133" cy="963083"/>
+        </a:xfrm>
+        <a:prstGeom prst="roundRect">
+          <a:avLst/>
+        </a:prstGeom>
+        <a:solidFill>
+          <a:schemeClr val="lt1">
+            <a:alpha val="90000"/>
+            <a:hueOff val="0"/>
+            <a:satOff val="0"/>
+            <a:lumOff val="0"/>
+            <a:alphaOff val="0"/>
+          </a:schemeClr>
+        </a:solidFill>
+        <a:ln w="12700" cap="flat" cmpd="sng" algn="ctr">
+          <a:solidFill>
+            <a:schemeClr val="accent1">
+              <a:hueOff val="0"/>
+              <a:satOff val="0"/>
+              <a:lumOff val="0"/>
+              <a:alphaOff val="0"/>
+            </a:schemeClr>
+          </a:solidFill>
+          <a:prstDash val="solid"/>
+          <a:miter lim="800000"/>
+        </a:ln>
+        <a:effectLst/>
+      </dsp:spPr>
+      <dsp:style>
+        <a:lnRef idx="2">
+          <a:scrgbClr r="0" g="0" b="0"/>
+        </a:lnRef>
+        <a:fillRef idx="1">
+          <a:scrgbClr r="0" g="0" b="0"/>
+        </a:fillRef>
+        <a:effectRef idx="0">
+          <a:scrgbClr r="0" g="0" b="0"/>
+        </a:effectRef>
+        <a:fontRef idx="minor"/>
+      </dsp:style>
+      <dsp:txBody>
+        <a:bodyPr spcFirstLastPara="0" vert="horz" wrap="square" lIns="91440" tIns="91440" rIns="91440" bIns="91440" numCol="1" spcCol="1270" anchor="ctr" anchorCtr="0">
+          <a:noAutofit/>
+        </a:bodyPr>
+        <a:lstStyle/>
+        <a:p>
+          <a:pPr marL="0" lvl="0" indent="0" algn="ctr" defTabSz="1066800">
+            <a:lnSpc>
+              <a:spcPct val="90000"/>
+            </a:lnSpc>
+            <a:spcBef>
+              <a:spcPct val="0"/>
+            </a:spcBef>
+            <a:spcAft>
+              <a:spcPct val="35000"/>
+            </a:spcAft>
+            <a:buNone/>
+          </a:pPr>
+          <a:r>
+            <a:rPr lang="en-US" sz="2400" kern="1200" dirty="0"/>
+            <a:t>Analytics Platform: Spark, Hadoop</a:t>
+          </a:r>
+        </a:p>
+      </dsp:txBody>
+      <dsp:txXfrm>
+        <a:off x="3704613" y="1672878"/>
+        <a:ext cx="3428105" cy="869055"/>
+      </dsp:txXfrm>
+    </dsp:sp>
+    <dsp:sp modelId="{14629C5F-6C08-4B29-882C-19088B064A82}">
+      <dsp:nvSpPr>
+        <dsp:cNvPr id="0" name=""/>
+        <dsp:cNvSpPr/>
+      </dsp:nvSpPr>
+      <dsp:spPr>
+        <a:xfrm>
+          <a:off x="3657599" y="2709333"/>
+          <a:ext cx="3522133" cy="963083"/>
+        </a:xfrm>
+        <a:prstGeom prst="roundRect">
+          <a:avLst/>
+        </a:prstGeom>
+        <a:solidFill>
+          <a:schemeClr val="lt1">
+            <a:alpha val="90000"/>
+            <a:hueOff val="0"/>
+            <a:satOff val="0"/>
+            <a:lumOff val="0"/>
+            <a:alphaOff val="0"/>
+          </a:schemeClr>
+        </a:solidFill>
+        <a:ln w="12700" cap="flat" cmpd="sng" algn="ctr">
+          <a:solidFill>
+            <a:schemeClr val="accent1">
+              <a:hueOff val="0"/>
+              <a:satOff val="0"/>
+              <a:lumOff val="0"/>
+              <a:alphaOff val="0"/>
+            </a:schemeClr>
+          </a:solidFill>
+          <a:prstDash val="solid"/>
+          <a:miter lim="800000"/>
+        </a:ln>
+        <a:effectLst/>
+      </dsp:spPr>
+      <dsp:style>
+        <a:lnRef idx="2">
+          <a:scrgbClr r="0" g="0" b="0"/>
+        </a:lnRef>
+        <a:fillRef idx="1">
+          <a:scrgbClr r="0" g="0" b="0"/>
+        </a:fillRef>
+        <a:effectRef idx="0">
+          <a:scrgbClr r="0" g="0" b="0"/>
+        </a:effectRef>
+        <a:fontRef idx="minor"/>
+      </dsp:style>
+      <dsp:txBody>
+        <a:bodyPr spcFirstLastPara="0" vert="horz" wrap="square" lIns="91440" tIns="91440" rIns="91440" bIns="91440" numCol="1" spcCol="1270" anchor="ctr" anchorCtr="0">
+          <a:noAutofit/>
+        </a:bodyPr>
+        <a:lstStyle/>
+        <a:p>
+          <a:pPr marL="0" lvl="0" indent="0" algn="ctr" defTabSz="1066800">
+            <a:lnSpc>
+              <a:spcPct val="90000"/>
+            </a:lnSpc>
+            <a:spcBef>
+              <a:spcPct val="0"/>
+            </a:spcBef>
+            <a:spcAft>
+              <a:spcPct val="35000"/>
+            </a:spcAft>
+            <a:buNone/>
+          </a:pPr>
+          <a:r>
+            <a:rPr lang="en-US" sz="2400" kern="1200" dirty="0"/>
+            <a:t>Data Migration: </a:t>
+          </a:r>
+          <a:r>
+            <a:rPr lang="en-US" sz="2400" kern="1200" dirty="0" err="1"/>
+            <a:t>Sqoop</a:t>
+          </a:r>
+          <a:r>
+            <a:rPr lang="en-US" sz="2400" kern="1200" dirty="0"/>
+            <a:t>, Flume, Kafka</a:t>
+          </a:r>
+        </a:p>
+      </dsp:txBody>
+      <dsp:txXfrm>
+        <a:off x="3704613" y="2756347"/>
+        <a:ext cx="3428105" cy="869055"/>
+      </dsp:txXfrm>
+    </dsp:sp>
+    <dsp:sp modelId="{FDC6A411-E160-41F8-98E2-AC97E3A31524}">
+      <dsp:nvSpPr>
+        <dsp:cNvPr id="0" name=""/>
+        <dsp:cNvSpPr/>
+      </dsp:nvSpPr>
+      <dsp:spPr>
+        <a:xfrm>
+          <a:off x="3657599" y="3792802"/>
+          <a:ext cx="3522133" cy="963083"/>
+        </a:xfrm>
+        <a:prstGeom prst="roundRect">
+          <a:avLst/>
+        </a:prstGeom>
+        <a:solidFill>
+          <a:schemeClr val="lt1">
+            <a:alpha val="90000"/>
+            <a:hueOff val="0"/>
+            <a:satOff val="0"/>
+            <a:lumOff val="0"/>
+            <a:alphaOff val="0"/>
+          </a:schemeClr>
+        </a:solidFill>
+        <a:ln w="12700" cap="flat" cmpd="sng" algn="ctr">
+          <a:solidFill>
+            <a:schemeClr val="accent1">
+              <a:hueOff val="0"/>
+              <a:satOff val="0"/>
+              <a:lumOff val="0"/>
+              <a:alphaOff val="0"/>
+            </a:schemeClr>
+          </a:solidFill>
+          <a:prstDash val="solid"/>
+          <a:miter lim="800000"/>
+        </a:ln>
+        <a:effectLst/>
+      </dsp:spPr>
+      <dsp:style>
+        <a:lnRef idx="2">
+          <a:scrgbClr r="0" g="0" b="0"/>
+        </a:lnRef>
+        <a:fillRef idx="1">
+          <a:scrgbClr r="0" g="0" b="0"/>
+        </a:fillRef>
+        <a:effectRef idx="0">
+          <a:scrgbClr r="0" g="0" b="0"/>
+        </a:effectRef>
+        <a:fontRef idx="minor"/>
+      </dsp:style>
+      <dsp:txBody>
+        <a:bodyPr spcFirstLastPara="0" vert="horz" wrap="square" lIns="91440" tIns="91440" rIns="91440" bIns="91440" numCol="1" spcCol="1270" anchor="ctr" anchorCtr="0">
+          <a:noAutofit/>
+        </a:bodyPr>
+        <a:lstStyle/>
+        <a:p>
+          <a:pPr marL="0" lvl="0" indent="0" algn="ctr" defTabSz="1066800">
+            <a:lnSpc>
+              <a:spcPct val="90000"/>
+            </a:lnSpc>
+            <a:spcBef>
+              <a:spcPct val="0"/>
+            </a:spcBef>
+            <a:spcAft>
+              <a:spcPct val="35000"/>
+            </a:spcAft>
+            <a:buNone/>
+          </a:pPr>
+          <a:r>
+            <a:rPr lang="en-US" sz="2400" kern="1200" dirty="0"/>
+            <a:t>Database: MySQL</a:t>
+          </a:r>
+        </a:p>
+      </dsp:txBody>
+      <dsp:txXfrm>
+        <a:off x="3704613" y="3839816"/>
+        <a:ext cx="3428105" cy="869055"/>
+      </dsp:txXfrm>
+    </dsp:sp>
+  </dsp:spTree>
+</dsp:drawing>
+</file>
+
+<file path=ppt/diagrams/layout1.xml><?xml version="1.0" encoding="utf-8"?>
+<dgm:layoutDef xmlns:dgm="http://schemas.openxmlformats.org/drawingml/2006/diagram" xmlns:a="http://schemas.openxmlformats.org/drawingml/2006/main" uniqueId="urn:microsoft.com/office/officeart/2005/8/layout/pyramid2">
+  <dgm:title val=""/>
+  <dgm:desc val=""/>
+  <dgm:catLst>
+    <dgm:cat type="pyramid" pri="3000"/>
+    <dgm:cat type="list" pri="21000"/>
+    <dgm:cat type="convert" pri="17000"/>
+  </dgm:catLst>
+  <dgm:sampData useDef="1">
+    <dgm:dataModel>
+      <dgm:ptLst/>
+      <dgm:bg/>
+      <dgm:whole/>
+    </dgm:dataModel>
+  </dgm:sampData>
+  <dgm:styleData useDef="1">
+    <dgm:dataModel>
+      <dgm:ptLst/>
+      <dgm:bg/>
+      <dgm:whole/>
+    </dgm:dataModel>
+  </dgm:styleData>
+  <dgm:clrData useDef="1">
+    <dgm:dataModel>
+      <dgm:ptLst/>
+      <dgm:bg/>
+      <dgm:whole/>
+    </dgm:dataModel>
+  </dgm:clrData>
+  <dgm:layoutNode name="compositeShape">
+    <dgm:alg type="composite"/>
+    <dgm:shape xmlns:r="http://schemas.openxmlformats.org/officeDocument/2006/relationships" r:blip="">
+      <dgm:adjLst/>
+    </dgm:shape>
+    <dgm:presOf/>
+    <dgm:varLst>
+      <dgm:dir/>
+      <dgm:resizeHandles/>
+    </dgm:varLst>
+    <dgm:choose name="Name0">
+      <dgm:if name="Name1" func="var" arg="dir" op="equ" val="norm">
+        <dgm:constrLst>
+          <dgm:constr type="w" for="ch" forName="pyramid" refType="h"/>
+          <dgm:constr type="h" for="ch" forName="pyramid" refType="h"/>
+          <dgm:constr type="h" for="ch" forName="theList" refType="h" fact="0.8"/>
+          <dgm:constr type="w" for="ch" forName="theList" refType="h" fact="0.65"/>
+          <dgm:constr type="ctrY" for="ch" forName="theList" refType="h" refFor="ch" refForName="pyramid" fact="0.5"/>
+          <dgm:constr type="l" for="ch" forName="theList" refType="w" refFor="ch" refForName="pyramid" fact="0.5"/>
+          <dgm:constr type="h" for="des" forName="aSpace" refType="h" fact="0.1"/>
+        </dgm:constrLst>
+      </dgm:if>
+      <dgm:else name="Name2">
+        <dgm:constrLst>
+          <dgm:constr type="w" for="ch" forName="pyramid" refType="h"/>
+          <dgm:constr type="h" for="ch" forName="pyramid" refType="h"/>
+          <dgm:constr type="h" for="ch" forName="theList" refType="h" fact="0.8"/>
+          <dgm:constr type="w" for="ch" forName="theList" refType="h" fact="0.65"/>
+          <dgm:constr type="ctrY" for="ch" forName="theList" refType="h" refFor="ch" refForName="pyramid" fact="0.5"/>
+          <dgm:constr type="r" for="ch" forName="theList" refType="w" refFor="ch" refForName="pyramid" fact="0.5"/>
+          <dgm:constr type="h" for="des" forName="aSpace" refType="h" fact="0.1"/>
+        </dgm:constrLst>
+      </dgm:else>
+    </dgm:choose>
+    <dgm:ruleLst/>
+    <dgm:choose name="Name3">
+      <dgm:if name="Name4" axis="ch" ptType="node" func="cnt" op="gte" val="1">
+        <dgm:layoutNode name="pyramid" styleLbl="node1">
+          <dgm:alg type="sp"/>
+          <dgm:shape xmlns:r="http://schemas.openxmlformats.org/officeDocument/2006/relationships" type="triangle" r:blip="">
+            <dgm:adjLst/>
+          </dgm:shape>
+          <dgm:presOf/>
+          <dgm:constrLst/>
+          <dgm:ruleLst/>
+        </dgm:layoutNode>
+        <dgm:layoutNode name="theList">
+          <dgm:alg type="lin">
+            <dgm:param type="linDir" val="fromT"/>
+          </dgm:alg>
+          <dgm:shape xmlns:r="http://schemas.openxmlformats.org/officeDocument/2006/relationships" r:blip="">
+            <dgm:adjLst/>
+          </dgm:shape>
+          <dgm:presOf/>
+          <dgm:constrLst>
+            <dgm:constr type="w" for="ch" forName="aNode" refType="w"/>
+            <dgm:constr type="h" for="ch" forName="aNode" refType="h"/>
+            <dgm:constr type="primFontSz" for="ch" ptType="node" op="equ"/>
+          </dgm:constrLst>
+          <dgm:ruleLst/>
+          <dgm:forEach name="aNodeForEach" axis="ch" ptType="node">
+            <dgm:layoutNode name="aNode" styleLbl="fgAcc1">
+              <dgm:varLst>
+                <dgm:bulletEnabled val="1"/>
+              </dgm:varLst>
+              <dgm:alg type="tx"/>
+              <dgm:shape xmlns:r="http://schemas.openxmlformats.org/officeDocument/2006/relationships" type="roundRect" r:blip="">
+                <dgm:adjLst/>
+              </dgm:shape>
+              <dgm:presOf axis="desOrSelf" ptType="node"/>
+              <dgm:constrLst>
+                <dgm:constr type="primFontSz" val="65"/>
+                <dgm:constr type="tMarg" refType="primFontSz" fact="0.3"/>
+                <dgm:constr type="bMarg" refType="primFontSz" fact="0.3"/>
+                <dgm:constr type="lMarg" refType="primFontSz" fact="0.3"/>
+                <dgm:constr type="rMarg" refType="primFontSz" fact="0.3"/>
+              </dgm:constrLst>
+              <dgm:ruleLst>
+                <dgm:rule type="primFontSz" val="5" fact="NaN" max="NaN"/>
+              </dgm:ruleLst>
+            </dgm:layoutNode>
+            <dgm:layoutNode name="aSpace">
+              <dgm:alg type="sp"/>
+              <dgm:shape xmlns:r="http://schemas.openxmlformats.org/officeDocument/2006/relationships" r:blip="">
+                <dgm:adjLst/>
+              </dgm:shape>
+              <dgm:presOf/>
+              <dgm:constrLst/>
+              <dgm:ruleLst/>
+            </dgm:layoutNode>
+          </dgm:forEach>
+        </dgm:layoutNode>
+      </dgm:if>
+      <dgm:else name="Name5"/>
+    </dgm:choose>
+  </dgm:layoutNode>
+</dgm:layoutDef>
+</file>
+
+<file path=ppt/diagrams/quickStyle1.xml><?xml version="1.0" encoding="utf-8"?>
+<dgm:styleDef xmlns:dgm="http://schemas.openxmlformats.org/drawingml/2006/diagram" xmlns:a="http://schemas.openxmlformats.org/drawingml/2006/main" uniqueId="urn:microsoft.com/office/officeart/2005/8/quickstyle/simple1">
+  <dgm:title val=""/>
+  <dgm:desc val=""/>
+  <dgm:catLst>
+    <dgm:cat type="simple" pri="10100"/>
+  </dgm:catLst>
+  <dgm:scene3d>
+    <a:camera prst="orthographicFront"/>
+    <a:lightRig rig="threePt" dir="t"/>
+  </dgm:scene3d>
+  <dgm:styleLbl name="node0">
+    <dgm:scene3d>
+      <a:camera prst="orthographicFront"/>
+      <a:lightRig rig="threePt" dir="t"/>
+    </dgm:scene3d>
+    <dgm:sp3d/>
+    <dgm:txPr/>
+    <dgm:style>
+      <a:lnRef idx="2">
+        <a:scrgbClr r="0" g="0" b="0"/>
+      </a:lnRef>
+      <a:fillRef idx="1">
+        <a:scrgbClr r="0" g="0" b="0"/>
+      </a:fillRef>
+      <a:effectRef idx="0">
+        <a:scrgbClr r="0" g="0" b="0"/>
+      </a:effectRef>
+      <a:fontRef idx="minor">
+        <a:schemeClr val="lt1"/>
+      </a:fontRef>
+    </dgm:style>
+  </dgm:styleLbl>
+  <dgm:styleLbl name="lnNode1">
+    <dgm:scene3d>
+      <a:camera prst="orthographicFront"/>
+      <a:lightRig rig="threePt" dir="t"/>
+    </dgm:scene3d>
+    <dgm:sp3d/>
+    <dgm:txPr/>
+    <dgm:style>
+      <a:lnRef idx="2">
+        <a:scrgbClr r="0" g="0" b="0"/>
+      </a:lnRef>
+      <a:fillRef idx="1">
+        <a:scrgbClr r="0" g="0" b="0"/>
+      </a:fillRef>
+      <a:effectRef idx="0">
+        <a:scrgbClr r="0" g="0" b="0"/>
+      </a:effectRef>
+      <a:fontRef idx="minor">
+        <a:schemeClr val="lt1"/>
+      </a:fontRef>
+    </dgm:style>
+  </dgm:styleLbl>
+  <dgm:styleLbl name="vennNode1">
+    <dgm:scene3d>
+      <a:camera prst="orthographicFront"/>
+      <a:lightRig rig="threePt" dir="t"/>
+    </dgm:scene3d>
+    <dgm:sp3d/>
+    <dgm:txPr/>
+    <dgm:style>
+      <a:lnRef idx="2">
+        <a:scrgbClr r="0" g="0" b="0"/>
+      </a:lnRef>
+      <a:fillRef idx="1">
+        <a:scrgbClr r="0" g="0" b="0"/>
+      </a:fillRef>
+      <a:effectRef idx="0">
+        <a:scrgbClr r="0" g="0" b="0"/>
+      </a:effectRef>
+      <a:fontRef idx="minor">
+        <a:schemeClr val="tx1"/>
+      </a:fontRef>
+    </dgm:style>
+  </dgm:styleLbl>
+  <dgm:styleLbl name="alignNode1">
+    <dgm:scene3d>
+      <a:camera prst="orthographicFront"/>
+      <a:lightRig rig="threePt" dir="t"/>
+    </dgm:scene3d>
+    <dgm:sp3d/>
+    <dgm:txPr/>
+    <dgm:style>
+      <a:lnRef idx="2">
+        <a:scrgbClr r="0" g="0" b="0"/>
+      </a:lnRef>
+      <a:fillRef idx="1">
+        <a:scrgbClr r="0" g="0" b="0"/>
+      </a:fillRef>
+      <a:effectRef idx="0">
+        <a:scrgbClr r="0" g="0" b="0"/>
+      </a:effectRef>
+      <a:fontRef idx="minor">
+        <a:schemeClr val="lt1"/>
+      </a:fontRef>
+    </dgm:style>
+  </dgm:styleLbl>
+  <dgm:styleLbl name="node1">
+    <dgm:scene3d>
+      <a:camera prst="orthographicFront"/>
+      <a:lightRig rig="threePt" dir="t"/>
+    </dgm:scene3d>
+    <dgm:sp3d/>
+    <dgm:txPr/>
+    <dgm:style>
+      <a:lnRef idx="2">
+        <a:scrgbClr r="0" g="0" b="0"/>
+      </a:lnRef>
+      <a:fillRef idx="1">
+        <a:scrgbClr r="0" g="0" b="0"/>
+      </a:fillRef>
+      <a:effectRef idx="0">
+        <a:scrgbClr r="0" g="0" b="0"/>
+      </a:effectRef>
+      <a:fontRef idx="minor">
+        <a:schemeClr val="lt1"/>
+      </a:fontRef>
+    </dgm:style>
+  </dgm:styleLbl>
+  <dgm:styleLbl name="node2">
+    <dgm:scene3d>
+      <a:camera prst="orthographicFront"/>
+      <a:lightRig rig="threePt" dir="t"/>
+    </dgm:scene3d>
+    <dgm:sp3d/>
+    <dgm:txPr/>
+    <dgm:style>
+      <a:lnRef idx="2">
+        <a:scrgbClr r="0" g="0" b="0"/>
+      </a:lnRef>
+      <a:fillRef idx="1">
+        <a:scrgbClr r="0" g="0" b="0"/>
+      </a:fillRef>
+      <a:effectRef idx="0">
+        <a:scrgbClr r="0" g="0" b="0"/>
+      </a:effectRef>
+      <a:fontRef idx="minor">
+        <a:schemeClr val="lt1"/>
+      </a:fontRef>
+    </dgm:style>
+  </dgm:styleLbl>
+  <dgm:styleLbl name="node3">
+    <dgm:scene3d>
+      <a:camera prst="orthographicFront"/>
+      <a:lightRig rig="threePt" dir="t"/>
+    </dgm:scene3d>
+    <dgm:sp3d/>
+    <dgm:txPr/>
+    <dgm:style>
+      <a:lnRef idx="2">
+        <a:scrgbClr r="0" g="0" b="0"/>
+      </a:lnRef>
+      <a:fillRef idx="1">
+        <a:scrgbClr r="0" g="0" b="0"/>
+      </a:fillRef>
+      <a:effectRef idx="0">
+        <a:scrgbClr r="0" g="0" b="0"/>
+      </a:effectRef>
+      <a:fontRef idx="minor">
+        <a:schemeClr val="lt1"/>
+      </a:fontRef>
+    </dgm:style>
+  </dgm:styleLbl>
+  <dgm:styleLbl name="node4">
+    <dgm:scene3d>
+      <a:camera prst="orthographicFront"/>
+      <a:lightRig rig="threePt" dir="t"/>
+    </dgm:scene3d>
+    <dgm:sp3d/>
+    <dgm:txPr/>
+    <dgm:style>
+      <a:lnRef idx="2">
+        <a:scrgbClr r="0" g="0" b="0"/>
+      </a:lnRef>
+      <a:fillRef idx="1">
+        <a:scrgbClr r="0" g="0" b="0"/>
+      </a:fillRef>
+      <a:effectRef idx="0">
+        <a:scrgbClr r="0" g="0" b="0"/>
+      </a:effectRef>
+      <a:fontRef idx="minor">
+        <a:schemeClr val="lt1"/>
+      </a:fontRef>
+    </dgm:style>
+  </dgm:styleLbl>
+  <dgm:styleLbl name="fgImgPlace1">
+    <dgm:scene3d>
+      <a:camera prst="orthographicFront"/>
+      <a:lightRig rig="threePt" dir="t"/>
+    </dgm:scene3d>
+    <dgm:sp3d/>
+    <dgm:txPr/>
+    <dgm:style>
+      <a:lnRef idx="2">
+        <a:scrgbClr r="0" g="0" b="0"/>
+      </a:lnRef>
+      <a:fillRef idx="1">
+        <a:scrgbClr r="0" g="0" b="0"/>
+      </a:fillRef>
+      <a:effectRef idx="0">
+        <a:scrgbClr r="0" g="0" b="0"/>
+      </a:effectRef>
+      <a:fontRef idx="minor"/>
+    </dgm:style>
+  </dgm:styleLbl>
+  <dgm:styleLbl name="alignImgPlace1">
+    <dgm:scene3d>
+      <a:camera prst="orthographicFront"/>
+      <a:lightRig rig="threePt" dir="t"/>
+    </dgm:scene3d>
+    <dgm:sp3d/>
+    <dgm:txPr/>
+    <dgm:style>
+      <a:lnRef idx="2">
+        <a:scrgbClr r="0" g="0" b="0"/>
+      </a:lnRef>
+      <a:fillRef idx="1">
+        <a:scrgbClr r="0" g="0" b="0"/>
+      </a:fillRef>
+      <a:effectRef idx="0">
+        <a:scrgbClr r="0" g="0" b="0"/>
+      </a:effectRef>
+      <a:fontRef idx="minor"/>
+    </dgm:style>
+  </dgm:styleLbl>
+  <dgm:styleLbl name="bgImgPlace1">
+    <dgm:scene3d>
+      <a:camera prst="orthographicFront"/>
+      <a:lightRig rig="threePt" dir="t"/>
+    </dgm:scene3d>
+    <dgm:sp3d/>
+    <dgm:txPr/>
+    <dgm:style>
+      <a:lnRef idx="2">
+        <a:scrgbClr r="0" g="0" b="0"/>
+      </a:lnRef>
+      <a:fillRef idx="1">
+        <a:scrgbClr r="0" g="0" b="0"/>
+      </a:fillRef>
+      <a:effectRef idx="0">
+        <a:scrgbClr r="0" g="0" b="0"/>
+      </a:effectRef>
+      <a:fontRef idx="minor"/>
+    </dgm:style>
+  </dgm:styleLbl>
+  <dgm:styleLbl name="sibTrans2D1">
+    <dgm:scene3d>
+      <a:camera prst="orthographicFront"/>
+      <a:lightRig rig="threePt" dir="t"/>
+    </dgm:scene3d>
+    <dgm:sp3d/>
+    <dgm:txPr/>
+    <dgm:style>
+      <a:lnRef idx="0">
+        <a:scrgbClr r="0" g="0" b="0"/>
+      </a:lnRef>
+      <a:fillRef idx="1">
+        <a:scrgbClr r="0" g="0" b="0"/>
+      </a:fillRef>
+      <a:effectRef idx="0">
+        <a:scrgbClr r="0" g="0" b="0"/>
+      </a:effectRef>
+      <a:fontRef idx="minor">
+        <a:schemeClr val="lt1"/>
+      </a:fontRef>
+    </dgm:style>
+  </dgm:styleLbl>
+  <dgm:styleLbl name="fgSibTrans2D1">
+    <dgm:scene3d>
+      <a:camera prst="orthographicFront"/>
+      <a:lightRig rig="threePt" dir="t"/>
+    </dgm:scene3d>
+    <dgm:sp3d/>
+    <dgm:txPr/>
+    <dgm:style>
+      <a:lnRef idx="0">
+        <a:scrgbClr r="0" g="0" b="0"/>
+      </a:lnRef>
+      <a:fillRef idx="1">
+        <a:scrgbClr r="0" g="0" b="0"/>
+      </a:fillRef>
+      <a:effectRef idx="0">
+        <a:scrgbClr r="0" g="0" b="0"/>
+      </a:effectRef>
+      <a:fontRef idx="minor">
+        <a:schemeClr val="lt1"/>
+      </a:fontRef>
+    </dgm:style>
+  </dgm:styleLbl>
+  <dgm:styleLbl name="bgSibTrans2D1">
+    <dgm:scene3d>
+      <a:camera prst="orthographicFront"/>
+      <a:lightRig rig="threePt" dir="t"/>
+    </dgm:scene3d>
+    <dgm:sp3d/>
+    <dgm:txPr/>
+    <dgm:style>
+      <a:lnRef idx="0">
+        <a:scrgbClr r="0" g="0" b="0"/>
+      </a:lnRef>
+      <a:fillRef idx="1">
+        <a:scrgbClr r="0" g="0" b="0"/>
+      </a:fillRef>
+      <a:effectRef idx="0">
+        <a:scrgbClr r="0" g="0" b="0"/>
+      </a:effectRef>
+      <a:fontRef idx="minor">
+        <a:schemeClr val="lt1"/>
+      </a:fontRef>
+    </dgm:style>
+  </dgm:styleLbl>
+  <dgm:styleLbl name="sibTrans1D1">
+    <dgm:scene3d>
+      <a:camera prst="orthographicFront"/>
+      <a:lightRig rig="threePt" dir="t"/>
+    </dgm:scene3d>
+    <dgm:sp3d/>
+    <dgm:txPr/>
+    <dgm:style>
+      <a:lnRef idx="1">
+        <a:scrgbClr r="0" g="0" b="0"/>
+      </a:lnRef>
+      <a:fillRef idx="0">
+        <a:scrgbClr r="0" g="0" b="0"/>
+      </a:fillRef>
+      <a:effectRef idx="0">
+        <a:scrgbClr r="0" g="0" b="0"/>
+      </a:effectRef>
+      <a:fontRef idx="minor"/>
+    </dgm:style>
+  </dgm:styleLbl>
+  <dgm:styleLbl name="callout">
+    <dgm:scene3d>
+      <a:camera prst="orthographicFront"/>
+      <a:lightRig rig="threePt" dir="t"/>
+    </dgm:scene3d>
+    <dgm:sp3d/>
+    <dgm:txPr/>
+    <dgm:style>
+      <a:lnRef idx="2">
+        <a:scrgbClr r="0" g="0" b="0"/>
+      </a:lnRef>
+      <a:fillRef idx="1">
+        <a:scrgbClr r="0" g="0" b="0"/>
+      </a:fillRef>
+      <a:effectRef idx="0">
+        <a:scrgbClr r="0" g="0" b="0"/>
+      </a:effectRef>
+      <a:fontRef idx="minor"/>
+    </dgm:style>
+  </dgm:styleLbl>
+  <dgm:styleLbl name="asst0">
+    <dgm:scene3d>
+      <a:camera prst="orthographicFront"/>
+      <a:lightRig rig="threePt" dir="t"/>
+    </dgm:scene3d>
+    <dgm:sp3d/>
+    <dgm:txPr/>
+    <dgm:style>
+      <a:lnRef idx="2">
+        <a:scrgbClr r="0" g="0" b="0"/>
+      </a:lnRef>
+      <a:fillRef idx="1">
+        <a:scrgbClr r="0" g="0" b="0"/>
+      </a:fillRef>
+      <a:effectRef idx="0">
+        <a:scrgbClr r="0" g="0" b="0"/>
+      </a:effectRef>
+      <a:fontRef idx="minor">
+        <a:schemeClr val="lt1"/>
+      </a:fontRef>
+    </dgm:style>
+  </dgm:styleLbl>
+  <dgm:styleLbl name="asst1">
+    <dgm:scene3d>
+      <a:camera prst="orthographicFront"/>
+      <a:lightRig rig="threePt" dir="t"/>
+    </dgm:scene3d>
+    <dgm:sp3d/>
+    <dgm:txPr/>
+    <dgm:style>
+      <a:lnRef idx="2">
+        <a:scrgbClr r="0" g="0" b="0"/>
+      </a:lnRef>
+      <a:fillRef idx="1">
+        <a:scrgbClr r="0" g="0" b="0"/>
+      </a:fillRef>
+      <a:effectRef idx="0">
+        <a:scrgbClr r="0" g="0" b="0"/>
+      </a:effectRef>
+      <a:fontRef idx="minor">
+        <a:schemeClr val="lt1"/>
+      </a:fontRef>
+    </dgm:style>
+  </dgm:styleLbl>
+  <dgm:styleLbl name="asst2">
+    <dgm:scene3d>
+      <a:camera prst="orthographicFront"/>
+      <a:lightRig rig="threePt" dir="t"/>
+    </dgm:scene3d>
+    <dgm:sp3d/>
+    <dgm:txPr/>
+    <dgm:style>
+      <a:lnRef idx="2">
+        <a:scrgbClr r="0" g="0" b="0"/>
+      </a:lnRef>
+      <a:fillRef idx="1">
+        <a:scrgbClr r="0" g="0" b="0"/>
+      </a:fillRef>
+      <a:effectRef idx="0">
+        <a:scrgbClr r="0" g="0" b="0"/>
+      </a:effectRef>
+      <a:fontRef idx="minor">
+        <a:schemeClr val="lt1"/>
+      </a:fontRef>
+    </dgm:style>
+  </dgm:styleLbl>
+  <dgm:styleLbl name="asst3">
+    <dgm:scene3d>
+      <a:camera prst="orthographicFront"/>
+      <a:lightRig rig="threePt" dir="t"/>
+    </dgm:scene3d>
+    <dgm:sp3d/>
+    <dgm:txPr/>
+    <dgm:style>
+      <a:lnRef idx="2">
+        <a:scrgbClr r="0" g="0" b="0"/>
+      </a:lnRef>
+      <a:fillRef idx="1">
+        <a:scrgbClr r="0" g="0" b="0"/>
+      </a:fillRef>
+      <a:effectRef idx="0">
+        <a:scrgbClr r="0" g="0" b="0"/>
+      </a:effectRef>
+      <a:fontRef idx="minor">
+        <a:schemeClr val="lt1"/>
+      </a:fontRef>
+    </dgm:style>
+  </dgm:styleLbl>
+  <dgm:styleLbl name="asst4">
+    <dgm:scene3d>
+      <a:camera prst="orthographicFront"/>
+      <a:lightRig rig="threePt" dir="t"/>
+    </dgm:scene3d>
+    <dgm:sp3d/>
+    <dgm:txPr/>
+    <dgm:style>
+      <a:lnRef idx="2">
+        <a:scrgbClr r="0" g="0" b="0"/>
+      </a:lnRef>
+      <a:fillRef idx="1">
+        <a:scrgbClr r="0" g="0" b="0"/>
+      </a:fillRef>
+      <a:effectRef idx="0">
+        <a:scrgbClr r="0" g="0" b="0"/>
+      </a:effectRef>
+      <a:fontRef idx="minor">
+        <a:schemeClr val="lt1"/>
+      </a:fontRef>
+    </dgm:style>
+  </dgm:styleLbl>
+  <dgm:styleLbl name="parChTrans2D1">
+    <dgm:scene3d>
+      <a:camera prst="orthographicFront"/>
+      <a:lightRig rig="threePt" dir="t"/>
+    </dgm:scene3d>
+    <dgm:sp3d/>
+    <dgm:txPr/>
+    <dgm:style>
+      <a:lnRef idx="2">
+        <a:scrgbClr r="0" g="0" b="0"/>
+      </a:lnRef>
+      <a:fillRef idx="1">
+        <a:scrgbClr r="0" g="0" b="0"/>
+      </a:fillRef>
+      <a:effectRef idx="0">
+        <a:scrgbClr r="0" g="0" b="0"/>
+      </a:effectRef>
+      <a:fontRef idx="minor">
+        <a:schemeClr val="lt1"/>
+      </a:fontRef>
+    </dgm:style>
+  </dgm:styleLbl>
+  <dgm:styleLbl name="parChTrans2D2">
+    <dgm:scene3d>
+      <a:camera prst="orthographicFront"/>
+      <a:lightRig rig="threePt" dir="t"/>
+    </dgm:scene3d>
+    <dgm:sp3d/>
+    <dgm:txPr/>
+    <dgm:style>
+      <a:lnRef idx="2">
+        <a:scrgbClr r="0" g="0" b="0"/>
+      </a:lnRef>
+      <a:fillRef idx="1">
+        <a:scrgbClr r="0" g="0" b="0"/>
+      </a:fillRef>
+      <a:effectRef idx="0">
+        <a:scrgbClr r="0" g="0" b="0"/>
+      </a:effectRef>
+      <a:fontRef idx="minor">
+        <a:schemeClr val="lt1"/>
+      </a:fontRef>
+    </dgm:style>
+  </dgm:styleLbl>
+  <dgm:styleLbl name="parChTrans2D3">
+    <dgm:scene3d>
+      <a:camera prst="orthographicFront"/>
+      <a:lightRig rig="threePt" dir="t"/>
+    </dgm:scene3d>
+    <dgm:sp3d/>
+    <dgm:txPr/>
+    <dgm:style>
+      <a:lnRef idx="2">
+        <a:scrgbClr r="0" g="0" b="0"/>
+      </a:lnRef>
+      <a:fillRef idx="1">
+        <a:scrgbClr r="0" g="0" b="0"/>
+      </a:fillRef>
+      <a:effectRef idx="0">
+        <a:scrgbClr r="0" g="0" b="0"/>
+      </a:effectRef>
+      <a:fontRef idx="minor">
+        <a:schemeClr val="lt1"/>
+      </a:fontRef>
+    </dgm:style>
+  </dgm:styleLbl>
+  <dgm:styleLbl name="parChTrans2D4">
+    <dgm:scene3d>
+      <a:camera prst="orthographicFront"/>
+      <a:lightRig rig="threePt" dir="t"/>
+    </dgm:scene3d>
+    <dgm:sp3d/>
+    <dgm:txPr/>
+    <dgm:style>
+      <a:lnRef idx="2">
+        <a:scrgbClr r="0" g="0" b="0"/>
+      </a:lnRef>
+      <a:fillRef idx="1">
+        <a:scrgbClr r="0" g="0" b="0"/>
+      </a:fillRef>
+      <a:effectRef idx="0">
+        <a:scrgbClr r="0" g="0" b="0"/>
+      </a:effectRef>
+      <a:fontRef idx="minor">
+        <a:schemeClr val="lt1"/>
+      </a:fontRef>
+    </dgm:style>
+  </dgm:styleLbl>
+  <dgm:styleLbl name="parChTrans1D1">
+    <dgm:scene3d>
+      <a:camera prst="orthographicFront"/>
+      <a:lightRig rig="threePt" dir="t"/>
+    </dgm:scene3d>
+    <dgm:sp3d/>
+    <dgm:txPr/>
+    <dgm:style>
+      <a:lnRef idx="2">
+        <a:scrgbClr r="0" g="0" b="0"/>
+      </a:lnRef>
+      <a:fillRef idx="0">
+        <a:scrgbClr r="0" g="0" b="0"/>
+      </a:fillRef>
+      <a:effectRef idx="0">
+        <a:scrgbClr r="0" g="0" b="0"/>
+      </a:effectRef>
+      <a:fontRef idx="minor"/>
+    </dgm:style>
+  </dgm:styleLbl>
+  <dgm:styleLbl name="parChTrans1D2">
+    <dgm:scene3d>
+      <a:camera prst="orthographicFront"/>
+      <a:lightRig rig="threePt" dir="t"/>
+    </dgm:scene3d>
+    <dgm:sp3d/>
+    <dgm:txPr/>
+    <dgm:style>
+      <a:lnRef idx="2">
+        <a:scrgbClr r="0" g="0" b="0"/>
+      </a:lnRef>
+      <a:fillRef idx="0">
+        <a:scrgbClr r="0" g="0" b="0"/>
+      </a:fillRef>
+      <a:effectRef idx="0">
+        <a:scrgbClr r="0" g="0" b="0"/>
+      </a:effectRef>
+      <a:fontRef idx="minor"/>
+    </dgm:style>
+  </dgm:styleLbl>
+  <dgm:styleLbl name="parChTrans1D3">
+    <dgm:scene3d>
+      <a:camera prst="orthographicFront"/>
+      <a:lightRig rig="threePt" dir="t"/>
+    </dgm:scene3d>
+    <dgm:sp3d/>
+    <dgm:txPr/>
+    <dgm:style>
+      <a:lnRef idx="2">
+        <a:scrgbClr r="0" g="0" b="0"/>
+      </a:lnRef>
+      <a:fillRef idx="0">
+        <a:scrgbClr r="0" g="0" b="0"/>
+      </a:fillRef>
+      <a:effectRef idx="0">
+        <a:scrgbClr r="0" g="0" b="0"/>
+      </a:effectRef>
+      <a:fontRef idx="minor"/>
+    </dgm:style>
+  </dgm:styleLbl>
+  <dgm:styleLbl name="parChTrans1D4">
+    <dgm:scene3d>
+      <a:camera prst="orthographicFront"/>
+      <a:lightRig rig="threePt" dir="t"/>
+    </dgm:scene3d>
+    <dgm:sp3d/>
+    <dgm:txPr/>
+    <dgm:style>
+      <a:lnRef idx="2">
+        <a:scrgbClr r="0" g="0" b="0"/>
+      </a:lnRef>
+      <a:fillRef idx="0">
+        <a:scrgbClr r="0" g="0" b="0"/>
+      </a:fillRef>
+      <a:effectRef idx="0">
+        <a:scrgbClr r="0" g="0" b="0"/>
+      </a:effectRef>
+      <a:fontRef idx="minor"/>
+    </dgm:style>
+  </dgm:styleLbl>
+  <dgm:styleLbl name="fgAcc1">
+    <dgm:scene3d>
+      <a:camera prst="orthographicFront"/>
+      <a:lightRig rig="threePt" dir="t"/>
+    </dgm:scene3d>
+    <dgm:sp3d/>
+    <dgm:txPr/>
+    <dgm:style>
+      <a:lnRef idx="2">
+        <a:scrgbClr r="0" g="0" b="0"/>
+      </a:lnRef>
+      <a:fillRef idx="1">
+        <a:scrgbClr r="0" g="0" b="0"/>
+      </a:fillRef>
+      <a:effectRef idx="0">
+        <a:scrgbClr r="0" g="0" b="0"/>
+      </a:effectRef>
+      <a:fontRef idx="minor"/>
+    </dgm:style>
+  </dgm:styleLbl>
+  <dgm:styleLbl name="conFgAcc1">
+    <dgm:scene3d>
+      <a:camera prst="orthographicFront"/>
+      <a:lightRig rig="threePt" dir="t"/>
+    </dgm:scene3d>
+    <dgm:sp3d/>
+    <dgm:txPr/>
+    <dgm:style>
+      <a:lnRef idx="2">
+        <a:scrgbClr r="0" g="0" b="0"/>
+      </a:lnRef>
+      <a:fillRef idx="1">
+        <a:scrgbClr r="0" g="0" b="0"/>
+      </a:fillRef>
+      <a:effectRef idx="0">
+        <a:scrgbClr r="0" g="0" b="0"/>
+      </a:effectRef>
+      <a:fontRef idx="minor"/>
+    </dgm:style>
+  </dgm:styleLbl>
+  <dgm:styleLbl name="alignAcc1">
+    <dgm:scene3d>
+      <a:camera prst="orthographicFront"/>
+      <a:lightRig rig="threePt" dir="t"/>
+    </dgm:scene3d>
+    <dgm:sp3d/>
+    <dgm:txPr/>
+    <dgm:style>
+      <a:lnRef idx="2">
+        <a:scrgbClr r="0" g="0" b="0"/>
+      </a:lnRef>
+      <a:fillRef idx="1">
+        <a:scrgbClr r="0" g="0" b="0"/>
+      </a:fillRef>
+      <a:effectRef idx="0">
+        <a:scrgbClr r="0" g="0" b="0"/>
+      </a:effectRef>
+      <a:fontRef idx="minor"/>
+    </dgm:style>
+  </dgm:styleLbl>
+  <dgm:styleLbl name="trAlignAcc1">
+    <dgm:scene3d>
+      <a:camera prst="orthographicFront"/>
+      <a:lightRig rig="threePt" dir="t"/>
+    </dgm:scene3d>
+    <dgm:sp3d/>
+    <dgm:txPr/>
+    <dgm:style>
+      <a:lnRef idx="1">
+        <a:scrgbClr r="0" g="0" b="0"/>
+      </a:lnRef>
+      <a:fillRef idx="1">
+        <a:scrgbClr r="0" g="0" b="0"/>
+      </a:fillRef>
+      <a:effectRef idx="0">
+        <a:scrgbClr r="0" g="0" b="0"/>
+      </a:effectRef>
+      <a:fontRef idx="minor"/>
+    </dgm:style>
+  </dgm:styleLbl>
+  <dgm:styleLbl name="bgAcc1">
+    <dgm:scene3d>
+      <a:camera prst="orthographicFront"/>
+      <a:lightRig rig="threePt" dir="t"/>
+    </dgm:scene3d>
+    <dgm:sp3d/>
+    <dgm:txPr/>
+    <dgm:style>
+      <a:lnRef idx="2">
+        <a:scrgbClr r="0" g="0" b="0"/>
+      </a:lnRef>
+      <a:fillRef idx="1">
+        <a:scrgbClr r="0" g="0" b="0"/>
+      </a:fillRef>
+      <a:effectRef idx="0">
+        <a:scrgbClr r="0" g="0" b="0"/>
+      </a:effectRef>
+      <a:fontRef idx="minor"/>
+    </dgm:style>
+  </dgm:styleLbl>
+  <dgm:styleLbl name="solidFgAcc1">
+    <dgm:scene3d>
+      <a:camera prst="orthographicFront"/>
+      <a:lightRig rig="threePt" dir="t"/>
+    </dgm:scene3d>
+    <dgm:sp3d/>
+    <dgm:txPr/>
+    <dgm:style>
+      <a:lnRef idx="2">
+        <a:scrgbClr r="0" g="0" b="0"/>
+      </a:lnRef>
+      <a:fillRef idx="1">
+        <a:scrgbClr r="0" g="0" b="0"/>
+      </a:fillRef>
+      <a:effectRef idx="0">
+        <a:scrgbClr r="0" g="0" b="0"/>
+      </a:effectRef>
+      <a:fontRef idx="minor"/>
+    </dgm:style>
+  </dgm:styleLbl>
+  <dgm:styleLbl name="solidAlignAcc1">
+    <dgm:scene3d>
+      <a:camera prst="orthographicFront"/>
+      <a:lightRig rig="threePt" dir="t"/>
+    </dgm:scene3d>
+    <dgm:sp3d/>
+    <dgm:txPr/>
+    <dgm:style>
+      <a:lnRef idx="2">
+        <a:scrgbClr r="0" g="0" b="0"/>
+      </a:lnRef>
+      <a:fillRef idx="1">
+        <a:scrgbClr r="0" g="0" b="0"/>
+      </a:fillRef>
+      <a:effectRef idx="0">
+        <a:scrgbClr r="0" g="0" b="0"/>
+      </a:effectRef>
+      <a:fontRef idx="minor"/>
+    </dgm:style>
+  </dgm:styleLbl>
+  <dgm:styleLbl name="solidBgAcc1">
+    <dgm:scene3d>
+      <a:camera prst="orthographicFront"/>
+      <a:lightRig rig="threePt" dir="t"/>
+    </dgm:scene3d>
+    <dgm:sp3d/>
+    <dgm:txPr/>
+    <dgm:style>
+      <a:lnRef idx="2">
+        <a:scrgbClr r="0" g="0" b="0"/>
+      </a:lnRef>
+      <a:fillRef idx="1">
+        <a:scrgbClr r="0" g="0" b="0"/>
+      </a:fillRef>
+      <a:effectRef idx="0">
+        <a:scrgbClr r="0" g="0" b="0"/>
+      </a:effectRef>
+      <a:fontRef idx="minor"/>
+    </dgm:style>
+  </dgm:styleLbl>
+  <dgm:styleLbl name="fgAccFollowNode1">
+    <dgm:scene3d>
+      <a:camera prst="orthographicFront"/>
+      <a:lightRig rig="threePt" dir="t"/>
+    </dgm:scene3d>
+    <dgm:sp3d/>
+    <dgm:txPr/>
+    <dgm:style>
+      <a:lnRef idx="2">
+        <a:scrgbClr r="0" g="0" b="0"/>
+      </a:lnRef>
+      <a:fillRef idx="1">
+        <a:scrgbClr r="0" g="0" b="0"/>
+      </a:fillRef>
+      <a:effectRef idx="0">
+        <a:scrgbClr r="0" g="0" b="0"/>
+      </a:effectRef>
+      <a:fontRef idx="minor"/>
+    </dgm:style>
+  </dgm:styleLbl>
+  <dgm:styleLbl name="alignAccFollowNode1">
+    <dgm:scene3d>
+      <a:camera prst="orthographicFront"/>
+      <a:lightRig rig="threePt" dir="t"/>
+    </dgm:scene3d>
+    <dgm:sp3d/>
+    <dgm:txPr/>
+    <dgm:style>
+      <a:lnRef idx="2">
+        <a:scrgbClr r="0" g="0" b="0"/>
+      </a:lnRef>
+      <a:fillRef idx="1">
+        <a:scrgbClr r="0" g="0" b="0"/>
+      </a:fillRef>
+      <a:effectRef idx="0">
+        <a:scrgbClr r="0" g="0" b="0"/>
+      </a:effectRef>
+      <a:fontRef idx="minor"/>
+    </dgm:style>
+  </dgm:styleLbl>
+  <dgm:styleLbl name="bgAccFollowNode1">
+    <dgm:scene3d>
+      <a:camera prst="orthographicFront"/>
+      <a:lightRig rig="threePt" dir="t"/>
+    </dgm:scene3d>
+    <dgm:sp3d/>
+    <dgm:txPr/>
+    <dgm:style>
+      <a:lnRef idx="2">
+        <a:scrgbClr r="0" g="0" b="0"/>
+      </a:lnRef>
+      <a:fillRef idx="1">
+        <a:scrgbClr r="0" g="0" b="0"/>
+      </a:fillRef>
+      <a:effectRef idx="0">
+        <a:scrgbClr r="0" g="0" b="0"/>
+      </a:effectRef>
+      <a:fontRef idx="minor"/>
+    </dgm:style>
+  </dgm:styleLbl>
+  <dgm:styleLbl name="fgAcc0">
+    <dgm:scene3d>
+      <a:camera prst="orthographicFront"/>
+      <a:lightRig rig="threePt" dir="t"/>
+    </dgm:scene3d>
+    <dgm:sp3d/>
+    <dgm:txPr/>
+    <dgm:style>
+      <a:lnRef idx="2">
+        <a:scrgbClr r="0" g="0" b="0"/>
+      </a:lnRef>
+      <a:fillRef idx="1">
+        <a:scrgbClr r="0" g="0" b="0"/>
+      </a:fillRef>
+      <a:effectRef idx="0">
+        <a:scrgbClr r="0" g="0" b="0"/>
+      </a:effectRef>
+      <a:fontRef idx="minor"/>
+    </dgm:style>
+  </dgm:styleLbl>
+  <dgm:styleLbl name="fgAcc2">
+    <dgm:scene3d>
+      <a:camera prst="orthographicFront"/>
+      <a:lightRig rig="threePt" dir="t"/>
+    </dgm:scene3d>
+    <dgm:sp3d/>
+    <dgm:txPr/>
+    <dgm:style>
+      <a:lnRef idx="2">
+        <a:scrgbClr r="0" g="0" b="0"/>
+      </a:lnRef>
+      <a:fillRef idx="1">
+        <a:scrgbClr r="0" g="0" b="0"/>
+      </a:fillRef>
+      <a:effectRef idx="0">
+        <a:scrgbClr r="0" g="0" b="0"/>
+      </a:effectRef>
+      <a:fontRef idx="minor"/>
+    </dgm:style>
+  </dgm:styleLbl>
+  <dgm:styleLbl name="fgAcc3">
+    <dgm:scene3d>
+      <a:camera prst="orthographicFront"/>
+      <a:lightRig rig="threePt" dir="t"/>
+    </dgm:scene3d>
+    <dgm:sp3d/>
+    <dgm:txPr/>
+    <dgm:style>
+      <a:lnRef idx="2">
+        <a:scrgbClr r="0" g="0" b="0"/>
+      </a:lnRef>
+      <a:fillRef idx="1">
+        <a:scrgbClr r="0" g="0" b="0"/>
+      </a:fillRef>
+      <a:effectRef idx="0">
+        <a:scrgbClr r="0" g="0" b="0"/>
+      </a:effectRef>
+      <a:fontRef idx="minor"/>
+    </dgm:style>
+  </dgm:styleLbl>
+  <dgm:styleLbl name="fgAcc4">
+    <dgm:scene3d>
+      <a:camera prst="orthographicFront"/>
+      <a:lightRig rig="threePt" dir="t"/>
+    </dgm:scene3d>
+    <dgm:sp3d/>
+    <dgm:txPr/>
+    <dgm:style>
+      <a:lnRef idx="2">
+        <a:scrgbClr r="0" g="0" b="0"/>
+      </a:lnRef>
+      <a:fillRef idx="1">
+        <a:scrgbClr r="0" g="0" b="0"/>
+      </a:fillRef>
+      <a:effectRef idx="0">
+        <a:scrgbClr r="0" g="0" b="0"/>
+      </a:effectRef>
+      <a:fontRef idx="minor"/>
+    </dgm:style>
+  </dgm:styleLbl>
+  <dgm:styleLbl name="bgShp">
+    <dgm:scene3d>
+      <a:camera prst="orthographicFront"/>
+      <a:lightRig rig="threePt" dir="t"/>
+    </dgm:scene3d>
+    <dgm:sp3d/>
+    <dgm:txPr/>
+    <dgm:style>
+      <a:lnRef idx="0">
+        <a:scrgbClr r="0" g="0" b="0"/>
+      </a:lnRef>
+      <a:fillRef idx="1">
+        <a:scrgbClr r="0" g="0" b="0"/>
+      </a:fillRef>
+      <a:effectRef idx="0">
+        <a:scrgbClr r="0" g="0" b="0"/>
+      </a:effectRef>
+      <a:fontRef idx="minor"/>
+    </dgm:style>
+  </dgm:styleLbl>
+  <dgm:styleLbl name="dkBgShp">
+    <dgm:scene3d>
+      <a:camera prst="orthographicFront"/>
+      <a:lightRig rig="threePt" dir="t"/>
+    </dgm:scene3d>
+    <dgm:sp3d/>
+    <dgm:txPr/>
+    <dgm:style>
+      <a:lnRef idx="0">
+        <a:scrgbClr r="0" g="0" b="0"/>
+      </a:lnRef>
+      <a:fillRef idx="1">
+        <a:scrgbClr r="0" g="0" b="0"/>
+      </a:fillRef>
+      <a:effectRef idx="0">
+        <a:scrgbClr r="0" g="0" b="0"/>
+      </a:effectRef>
+      <a:fontRef idx="minor"/>
+    </dgm:style>
+  </dgm:styleLbl>
+  <dgm:styleLbl name="trBgShp">
+    <dgm:scene3d>
+      <a:camera prst="orthographicFront"/>
+      <a:lightRig rig="threePt" dir="t"/>
+    </dgm:scene3d>
+    <dgm:sp3d/>
+    <dgm:txPr/>
+    <dgm:style>
+      <a:lnRef idx="0">
+        <a:scrgbClr r="0" g="0" b="0"/>
+      </a:lnRef>
+      <a:fillRef idx="1">
+        <a:scrgbClr r="0" g="0" b="0"/>
+      </a:fillRef>
+      <a:effectRef idx="0">
+        <a:scrgbClr r="0" g="0" b="0"/>
+      </a:effectRef>
+      <a:fontRef idx="minor"/>
+    </dgm:style>
+  </dgm:styleLbl>
+  <dgm:styleLbl name="fgShp">
+    <dgm:scene3d>
+      <a:camera prst="orthographicFront"/>
+      <a:lightRig rig="threePt" dir="t"/>
+    </dgm:scene3d>
+    <dgm:sp3d/>
+    <dgm:txPr/>
+    <dgm:style>
+      <a:lnRef idx="2">
+        <a:scrgbClr r="0" g="0" b="0"/>
+      </a:lnRef>
+      <a:fillRef idx="1">
+        <a:scrgbClr r="0" g="0" b="0"/>
+      </a:fillRef>
+      <a:effectRef idx="0">
+        <a:scrgbClr r="0" g="0" b="0"/>
+      </a:effectRef>
+      <a:fontRef idx="minor"/>
+    </dgm:style>
+  </dgm:styleLbl>
+  <dgm:styleLbl name="revTx">
+    <dgm:scene3d>
+      <a:camera prst="orthographicFront"/>
+      <a:lightRig rig="threePt" dir="t"/>
+    </dgm:scene3d>
+    <dgm:sp3d/>
+    <dgm:txPr/>
+    <dgm:style>
+      <a:lnRef idx="0">
+        <a:scrgbClr r="0" g="0" b="0"/>
+      </a:lnRef>
+      <a:fillRef idx="0">
+        <a:scrgbClr r="0" g="0" b="0"/>
+      </a:fillRef>
+      <a:effectRef idx="0">
+        <a:scrgbClr r="0" g="0" b="0"/>
+      </a:effectRef>
+      <a:fontRef idx="minor"/>
+    </dgm:style>
+  </dgm:styleLbl>
+</dgm:styleDef>
 </file>
 
 <file path=ppt/slideLayouts/slideLayout1.xml><?xml version="1.0" encoding="utf-8"?>
@@ -2996,25 +5545,6 @@
           </a:p>
         </p:txBody>
       </p:sp>
-      <p:sp>
-        <p:nvSpPr>
-          <p:cNvPr id="3" name="Subtitle 2"/>
-          <p:cNvSpPr>
-            <a:spLocks noGrp="1"/>
-          </p:cNvSpPr>
-          <p:nvPr>
-            <p:ph type="subTitle" idx="1"/>
-          </p:nvPr>
-        </p:nvSpPr>
-        <p:spPr/>
-        <p:txBody>
-          <a:bodyPr/>
-          <a:lstStyle/>
-          <a:p>
-            <a:endParaRPr lang="en-IN"/>
-          </a:p>
-        </p:txBody>
-      </p:sp>
     </p:spTree>
     <p:extLst>
       <p:ext uri="{BB962C8B-B14F-4D97-AF65-F5344CB8AC3E}">
@@ -3103,10 +5633,7 @@
           <a:lstStyle/>
           <a:p>
             <a:pPr algn="ctr"/>
-            <a:r>
-              <a:rPr lang="en-IN" dirty="0"/>
-              <a:t>App 1</a:t>
-            </a:r>
+            <a:endParaRPr lang="en-IN"/>
           </a:p>
         </p:txBody>
       </p:sp>
@@ -3146,10 +5673,7 @@
           <a:lstStyle/>
           <a:p>
             <a:pPr algn="ctr"/>
-            <a:r>
-              <a:rPr lang="en-IN" dirty="0"/>
-              <a:t>App 2</a:t>
-            </a:r>
+            <a:endParaRPr lang="en-IN"/>
           </a:p>
         </p:txBody>
       </p:sp>
@@ -3189,10 +5713,7 @@
           <a:lstStyle/>
           <a:p>
             <a:pPr algn="ctr"/>
-            <a:r>
-              <a:rPr lang="en-IN" dirty="0"/>
-              <a:t>App 3</a:t>
-            </a:r>
+            <a:endParaRPr lang="en-IN"/>
           </a:p>
         </p:txBody>
       </p:sp>
@@ -3732,7 +6253,6 @@
         <p:nvCxnSpPr>
           <p:cNvPr id="30" name="Elbow Connector 29"/>
           <p:cNvCxnSpPr>
-            <a:cxnSpLocks/>
             <a:stCxn id="11" idx="3"/>
             <a:endCxn id="15" idx="1"/>
           </p:cNvCxnSpPr>
@@ -3797,13 +6317,7 @@
       </p:grpSpPr>
       <p:sp>
         <p:nvSpPr>
-          <p:cNvPr id="2" name="Title 1">
-            <a:extLst>
-              <a:ext uri="{FF2B5EF4-FFF2-40B4-BE49-F238E27FC236}">
-                <a16:creationId xmlns:a16="http://schemas.microsoft.com/office/drawing/2014/main" id="{60B09D7E-0A27-49B0-9215-5D61D3CA01C4}"/>
-              </a:ext>
-            </a:extLst>
-          </p:cNvPr>
+          <p:cNvPr id="3" name="Title 2"/>
           <p:cNvSpPr>
             <a:spLocks noGrp="1"/>
           </p:cNvSpPr>
@@ -3816,14 +6330,1180 @@
           <a:bodyPr/>
           <a:lstStyle/>
           <a:p>
-            <a:endParaRPr lang="en-US"/>
+            <a:r>
+              <a:rPr lang="en-US" dirty="0"/>
+              <a:t>Consolidated dashboard for multiple application/services Big data analysis</a:t>
+            </a:r>
+            <a:endParaRPr lang="en-IN" dirty="0"/>
+          </a:p>
+        </p:txBody>
+      </p:sp>
+      <p:sp>
+        <p:nvSpPr>
+          <p:cNvPr id="4" name="Content Placeholder 3"/>
+          <p:cNvSpPr>
+            <a:spLocks noGrp="1"/>
+          </p:cNvSpPr>
+          <p:nvPr>
+            <p:ph idx="1"/>
+          </p:nvPr>
+        </p:nvSpPr>
+        <p:spPr/>
+        <p:txBody>
+          <a:bodyPr/>
+          <a:lstStyle/>
+          <a:p>
+            <a:r>
+              <a:rPr lang="en-US" dirty="0"/>
+              <a:t>You have different applications feeding their individual capabilities and features or statistics. Debugging an issue requires logging into each individual box/machine/server to analyze the logs. With a small number of apps/boxes it's not an issue, but it quickly becomes tedious as the number of apps/services increases as users have to go to each individual dashboard to check the app/service statistics.</a:t>
+            </a:r>
+            <a:endParaRPr lang="en-IN" dirty="0"/>
           </a:p>
         </p:txBody>
       </p:sp>
     </p:spTree>
     <p:extLst>
       <p:ext uri="{BB962C8B-B14F-4D97-AF65-F5344CB8AC3E}">
-        <p14:creationId xmlns:p14="http://schemas.microsoft.com/office/powerpoint/2010/main" val="4249053801"/>
+        <p14:creationId xmlns:p14="http://schemas.microsoft.com/office/powerpoint/2010/main" val="1713947785"/>
+      </p:ext>
+    </p:extLst>
+  </p:cSld>
+  <p:clrMapOvr>
+    <a:masterClrMapping/>
+  </p:clrMapOvr>
+</p:sld>
+</file>
+
+<file path=ppt/slides/slide4.xml><?xml version="1.0" encoding="utf-8"?>
+<p:sld xmlns:a="http://schemas.openxmlformats.org/drawingml/2006/main" xmlns:r="http://schemas.openxmlformats.org/officeDocument/2006/relationships" xmlns:p="http://schemas.openxmlformats.org/presentationml/2006/main">
+  <p:cSld>
+    <p:spTree>
+      <p:nvGrpSpPr>
+        <p:cNvPr id="1" name=""/>
+        <p:cNvGrpSpPr/>
+        <p:nvPr/>
+      </p:nvGrpSpPr>
+      <p:grpSpPr>
+        <a:xfrm>
+          <a:off x="0" y="0"/>
+          <a:ext cx="0" cy="0"/>
+          <a:chOff x="0" y="0"/>
+          <a:chExt cx="0" cy="0"/>
+        </a:xfrm>
+      </p:grpSpPr>
+      <p:sp>
+        <p:nvSpPr>
+          <p:cNvPr id="2" name="Title 1"/>
+          <p:cNvSpPr>
+            <a:spLocks noGrp="1"/>
+          </p:cNvSpPr>
+          <p:nvPr>
+            <p:ph type="title"/>
+          </p:nvPr>
+        </p:nvSpPr>
+        <p:spPr/>
+        <p:txBody>
+          <a:bodyPr/>
+          <a:lstStyle/>
+          <a:p>
+            <a:r>
+              <a:rPr lang="en-IN" dirty="0"/>
+              <a:t>Solution</a:t>
+            </a:r>
+          </a:p>
+        </p:txBody>
+      </p:sp>
+      <p:sp>
+        <p:nvSpPr>
+          <p:cNvPr id="3" name="Content Placeholder 2"/>
+          <p:cNvSpPr>
+            <a:spLocks noGrp="1"/>
+          </p:cNvSpPr>
+          <p:nvPr>
+            <p:ph idx="1"/>
+          </p:nvPr>
+        </p:nvSpPr>
+        <p:spPr/>
+        <p:txBody>
+          <a:bodyPr/>
+          <a:lstStyle/>
+          <a:p>
+            <a:pPr marL="0" indent="0">
+              <a:buNone/>
+            </a:pPr>
+            <a:r>
+              <a:rPr lang="en-US" dirty="0"/>
+              <a:t>It would be awesome to have all of your logs in on agent beat / monitoring scripts/modules. Example if we need to monitor network activity we have to wright log-stash input into elastic-search same for any other input. What if there is only one ingest Parton for all network input.</a:t>
+            </a:r>
+            <a:endParaRPr lang="en-IN" dirty="0"/>
+          </a:p>
+        </p:txBody>
+      </p:sp>
+    </p:spTree>
+    <p:extLst>
+      <p:ext uri="{BB962C8B-B14F-4D97-AF65-F5344CB8AC3E}">
+        <p14:creationId xmlns:p14="http://schemas.microsoft.com/office/powerpoint/2010/main" val="3849589611"/>
+      </p:ext>
+    </p:extLst>
+  </p:cSld>
+  <p:clrMapOvr>
+    <a:masterClrMapping/>
+  </p:clrMapOvr>
+</p:sld>
+</file>
+
+<file path=ppt/slides/slide5.xml><?xml version="1.0" encoding="utf-8"?>
+<p:sld xmlns:a="http://schemas.openxmlformats.org/drawingml/2006/main" xmlns:r="http://schemas.openxmlformats.org/officeDocument/2006/relationships" xmlns:p="http://schemas.openxmlformats.org/presentationml/2006/main">
+  <p:cSld>
+    <p:spTree>
+      <p:nvGrpSpPr>
+        <p:cNvPr id="1" name=""/>
+        <p:cNvGrpSpPr/>
+        <p:nvPr/>
+      </p:nvGrpSpPr>
+      <p:grpSpPr>
+        <a:xfrm>
+          <a:off x="0" y="0"/>
+          <a:ext cx="0" cy="0"/>
+          <a:chOff x="0" y="0"/>
+          <a:chExt cx="0" cy="0"/>
+        </a:xfrm>
+      </p:grpSpPr>
+      <p:sp>
+        <p:nvSpPr>
+          <p:cNvPr id="2" name="Title 1"/>
+          <p:cNvSpPr>
+            <a:spLocks noGrp="1"/>
+          </p:cNvSpPr>
+          <p:nvPr>
+            <p:ph type="title"/>
+          </p:nvPr>
+        </p:nvSpPr>
+        <p:spPr/>
+        <p:txBody>
+          <a:bodyPr/>
+          <a:lstStyle/>
+          <a:p>
+            <a:r>
+              <a:rPr lang="en-IN" dirty="0"/>
+              <a:t>Tech Stack</a:t>
+            </a:r>
+          </a:p>
+        </p:txBody>
+      </p:sp>
+      <p:graphicFrame>
+        <p:nvGraphicFramePr>
+          <p:cNvPr id="4" name="Diagram 3"/>
+          <p:cNvGraphicFramePr/>
+          <p:nvPr>
+            <p:extLst>
+              <p:ext uri="{D42A27DB-BD31-4B8C-83A1-F6EECF244321}">
+                <p14:modId xmlns:p14="http://schemas.microsoft.com/office/powerpoint/2010/main" val="3233723524"/>
+              </p:ext>
+            </p:extLst>
+          </p:nvPr>
+        </p:nvGraphicFramePr>
+        <p:xfrm>
+          <a:off x="2032000" y="719666"/>
+          <a:ext cx="8128000" cy="5418667"/>
+        </p:xfrm>
+        <a:graphic>
+          <a:graphicData uri="http://schemas.openxmlformats.org/drawingml/2006/diagram">
+            <dgm:relIds xmlns:dgm="http://schemas.openxmlformats.org/drawingml/2006/diagram" xmlns:r="http://schemas.openxmlformats.org/officeDocument/2006/relationships" r:dm="rId2" r:lo="rId3" r:qs="rId4" r:cs="rId5"/>
+          </a:graphicData>
+        </a:graphic>
+      </p:graphicFrame>
+    </p:spTree>
+    <p:extLst>
+      <p:ext uri="{BB962C8B-B14F-4D97-AF65-F5344CB8AC3E}">
+        <p14:creationId xmlns:p14="http://schemas.microsoft.com/office/powerpoint/2010/main" val="1088752000"/>
+      </p:ext>
+    </p:extLst>
+  </p:cSld>
+  <p:clrMapOvr>
+    <a:masterClrMapping/>
+  </p:clrMapOvr>
+</p:sld>
+</file>
+
+<file path=ppt/slides/slide6.xml><?xml version="1.0" encoding="utf-8"?>
+<p:sld xmlns:a="http://schemas.openxmlformats.org/drawingml/2006/main" xmlns:r="http://schemas.openxmlformats.org/officeDocument/2006/relationships" xmlns:p="http://schemas.openxmlformats.org/presentationml/2006/main">
+  <p:cSld>
+    <p:spTree>
+      <p:nvGrpSpPr>
+        <p:cNvPr id="1" name=""/>
+        <p:cNvGrpSpPr/>
+        <p:nvPr/>
+      </p:nvGrpSpPr>
+      <p:grpSpPr>
+        <a:xfrm>
+          <a:off x="0" y="0"/>
+          <a:ext cx="0" cy="0"/>
+          <a:chOff x="0" y="0"/>
+          <a:chExt cx="0" cy="0"/>
+        </a:xfrm>
+      </p:grpSpPr>
+      <p:sp>
+        <p:nvSpPr>
+          <p:cNvPr id="2" name="Title 1"/>
+          <p:cNvSpPr>
+            <a:spLocks noGrp="1"/>
+          </p:cNvSpPr>
+          <p:nvPr>
+            <p:ph type="title"/>
+          </p:nvPr>
+        </p:nvSpPr>
+        <p:spPr/>
+        <p:txBody>
+          <a:bodyPr/>
+          <a:lstStyle/>
+          <a:p>
+            <a:r>
+              <a:rPr lang="en-IN" dirty="0"/>
+              <a:t>Technical Architecture</a:t>
+            </a:r>
+          </a:p>
+        </p:txBody>
+      </p:sp>
+      <p:sp>
+        <p:nvSpPr>
+          <p:cNvPr id="3" name="Rectangle 2"/>
+          <p:cNvSpPr/>
+          <p:nvPr/>
+        </p:nvSpPr>
+        <p:spPr>
+          <a:xfrm>
+            <a:off x="479685" y="1858780"/>
+            <a:ext cx="914400" cy="914400"/>
+          </a:xfrm>
+          <a:prstGeom prst="rect">
+            <a:avLst/>
+          </a:prstGeom>
+        </p:spPr>
+        <p:style>
+          <a:lnRef idx="2">
+            <a:schemeClr val="accent1">
+              <a:shade val="50000"/>
+            </a:schemeClr>
+          </a:lnRef>
+          <a:fillRef idx="1">
+            <a:schemeClr val="accent1"/>
+          </a:fillRef>
+          <a:effectRef idx="0">
+            <a:schemeClr val="accent1"/>
+          </a:effectRef>
+          <a:fontRef idx="minor">
+            <a:schemeClr val="lt1"/>
+          </a:fontRef>
+        </p:style>
+        <p:txBody>
+          <a:bodyPr rtlCol="0" anchor="ctr"/>
+          <a:lstStyle/>
+          <a:p>
+            <a:pPr algn="ctr"/>
+            <a:r>
+              <a:rPr lang="en-IN"/>
+              <a:t>App1</a:t>
+            </a:r>
+          </a:p>
+        </p:txBody>
+      </p:sp>
+      <p:sp>
+        <p:nvSpPr>
+          <p:cNvPr id="4" name="Rectangle 3"/>
+          <p:cNvSpPr/>
+          <p:nvPr/>
+        </p:nvSpPr>
+        <p:spPr>
+          <a:xfrm>
+            <a:off x="479685" y="2941272"/>
+            <a:ext cx="914400" cy="914400"/>
+          </a:xfrm>
+          <a:prstGeom prst="rect">
+            <a:avLst/>
+          </a:prstGeom>
+        </p:spPr>
+        <p:style>
+          <a:lnRef idx="2">
+            <a:schemeClr val="accent1">
+              <a:shade val="50000"/>
+            </a:schemeClr>
+          </a:lnRef>
+          <a:fillRef idx="1">
+            <a:schemeClr val="accent1"/>
+          </a:fillRef>
+          <a:effectRef idx="0">
+            <a:schemeClr val="accent1"/>
+          </a:effectRef>
+          <a:fontRef idx="minor">
+            <a:schemeClr val="lt1"/>
+          </a:fontRef>
+        </p:style>
+        <p:txBody>
+          <a:bodyPr rtlCol="0" anchor="ctr"/>
+          <a:lstStyle/>
+          <a:p>
+            <a:pPr algn="ctr"/>
+            <a:r>
+              <a:rPr lang="en-IN" dirty="0"/>
+              <a:t>App2</a:t>
+            </a:r>
+          </a:p>
+        </p:txBody>
+      </p:sp>
+      <p:sp>
+        <p:nvSpPr>
+          <p:cNvPr id="5" name="Rectangle 4"/>
+          <p:cNvSpPr/>
+          <p:nvPr/>
+        </p:nvSpPr>
+        <p:spPr>
+          <a:xfrm>
+            <a:off x="479685" y="4023764"/>
+            <a:ext cx="914400" cy="914400"/>
+          </a:xfrm>
+          <a:prstGeom prst="rect">
+            <a:avLst/>
+          </a:prstGeom>
+        </p:spPr>
+        <p:style>
+          <a:lnRef idx="2">
+            <a:schemeClr val="accent1">
+              <a:shade val="50000"/>
+            </a:schemeClr>
+          </a:lnRef>
+          <a:fillRef idx="1">
+            <a:schemeClr val="accent1"/>
+          </a:fillRef>
+          <a:effectRef idx="0">
+            <a:schemeClr val="accent1"/>
+          </a:effectRef>
+          <a:fontRef idx="minor">
+            <a:schemeClr val="lt1"/>
+          </a:fontRef>
+        </p:style>
+        <p:txBody>
+          <a:bodyPr rtlCol="0" anchor="ctr"/>
+          <a:lstStyle/>
+          <a:p>
+            <a:pPr algn="ctr"/>
+            <a:r>
+              <a:rPr lang="en-IN" dirty="0"/>
+              <a:t>App3</a:t>
+            </a:r>
+          </a:p>
+        </p:txBody>
+      </p:sp>
+      <p:sp>
+        <p:nvSpPr>
+          <p:cNvPr id="6" name="Rectangle 5"/>
+          <p:cNvSpPr/>
+          <p:nvPr/>
+        </p:nvSpPr>
+        <p:spPr>
+          <a:xfrm>
+            <a:off x="479685" y="5301126"/>
+            <a:ext cx="914400" cy="914400"/>
+          </a:xfrm>
+          <a:prstGeom prst="rect">
+            <a:avLst/>
+          </a:prstGeom>
+        </p:spPr>
+        <p:style>
+          <a:lnRef idx="2">
+            <a:schemeClr val="accent1">
+              <a:shade val="50000"/>
+            </a:schemeClr>
+          </a:lnRef>
+          <a:fillRef idx="1">
+            <a:schemeClr val="accent1"/>
+          </a:fillRef>
+          <a:effectRef idx="0">
+            <a:schemeClr val="accent1"/>
+          </a:effectRef>
+          <a:fontRef idx="minor">
+            <a:schemeClr val="lt1"/>
+          </a:fontRef>
+        </p:style>
+        <p:txBody>
+          <a:bodyPr rtlCol="0" anchor="ctr"/>
+          <a:lstStyle/>
+          <a:p>
+            <a:pPr algn="ctr"/>
+            <a:r>
+              <a:rPr lang="en-IN" dirty="0" err="1"/>
+              <a:t>App..n</a:t>
+            </a:r>
+            <a:endParaRPr lang="en-IN" dirty="0"/>
+          </a:p>
+        </p:txBody>
+      </p:sp>
+      <p:sp>
+        <p:nvSpPr>
+          <p:cNvPr id="7" name="Rounded Rectangle 6"/>
+          <p:cNvSpPr/>
+          <p:nvPr/>
+        </p:nvSpPr>
+        <p:spPr>
+          <a:xfrm>
+            <a:off x="2218547" y="2341662"/>
+            <a:ext cx="2188564" cy="914400"/>
+          </a:xfrm>
+          <a:prstGeom prst="roundRect">
+            <a:avLst/>
+          </a:prstGeom>
+        </p:spPr>
+        <p:style>
+          <a:lnRef idx="2">
+            <a:schemeClr val="accent1">
+              <a:shade val="50000"/>
+            </a:schemeClr>
+          </a:lnRef>
+          <a:fillRef idx="1">
+            <a:schemeClr val="accent1"/>
+          </a:fillRef>
+          <a:effectRef idx="0">
+            <a:schemeClr val="accent1"/>
+          </a:effectRef>
+          <a:fontRef idx="minor">
+            <a:schemeClr val="lt1"/>
+          </a:fontRef>
+        </p:style>
+        <p:txBody>
+          <a:bodyPr rtlCol="0" anchor="ctr"/>
+          <a:lstStyle/>
+          <a:p>
+            <a:pPr algn="ctr"/>
+            <a:r>
+              <a:rPr lang="en-IN" dirty="0"/>
+              <a:t>SQOOP</a:t>
+            </a:r>
+          </a:p>
+          <a:p>
+            <a:pPr algn="ctr"/>
+            <a:r>
+              <a:rPr lang="en-IN" dirty="0"/>
+              <a:t>(Structured Data Migration)</a:t>
+            </a:r>
+          </a:p>
+        </p:txBody>
+      </p:sp>
+      <p:sp>
+        <p:nvSpPr>
+          <p:cNvPr id="8" name="Rounded Rectangle 7"/>
+          <p:cNvSpPr/>
+          <p:nvPr/>
+        </p:nvSpPr>
+        <p:spPr>
+          <a:xfrm>
+            <a:off x="2218547" y="3592246"/>
+            <a:ext cx="2188564" cy="914400"/>
+          </a:xfrm>
+          <a:prstGeom prst="roundRect">
+            <a:avLst/>
+          </a:prstGeom>
+        </p:spPr>
+        <p:style>
+          <a:lnRef idx="2">
+            <a:schemeClr val="accent1">
+              <a:shade val="50000"/>
+            </a:schemeClr>
+          </a:lnRef>
+          <a:fillRef idx="1">
+            <a:schemeClr val="accent1"/>
+          </a:fillRef>
+          <a:effectRef idx="0">
+            <a:schemeClr val="accent1"/>
+          </a:effectRef>
+          <a:fontRef idx="minor">
+            <a:schemeClr val="lt1"/>
+          </a:fontRef>
+        </p:style>
+        <p:txBody>
+          <a:bodyPr rtlCol="0" anchor="ctr"/>
+          <a:lstStyle/>
+          <a:p>
+            <a:pPr algn="ctr"/>
+            <a:r>
+              <a:rPr lang="en-IN" dirty="0"/>
+              <a:t>Flume</a:t>
+            </a:r>
+          </a:p>
+          <a:p>
+            <a:pPr algn="ctr"/>
+            <a:r>
+              <a:rPr lang="en-IN" dirty="0"/>
+              <a:t>(Log Data Migration)</a:t>
+            </a:r>
+          </a:p>
+        </p:txBody>
+      </p:sp>
+      <p:sp>
+        <p:nvSpPr>
+          <p:cNvPr id="9" name="Rounded Rectangle 8"/>
+          <p:cNvSpPr/>
+          <p:nvPr/>
+        </p:nvSpPr>
+        <p:spPr>
+          <a:xfrm>
+            <a:off x="2218547" y="4842830"/>
+            <a:ext cx="2188564" cy="914400"/>
+          </a:xfrm>
+          <a:prstGeom prst="roundRect">
+            <a:avLst/>
+          </a:prstGeom>
+        </p:spPr>
+        <p:style>
+          <a:lnRef idx="2">
+            <a:schemeClr val="accent1">
+              <a:shade val="50000"/>
+            </a:schemeClr>
+          </a:lnRef>
+          <a:fillRef idx="1">
+            <a:schemeClr val="accent1"/>
+          </a:fillRef>
+          <a:effectRef idx="0">
+            <a:schemeClr val="accent1"/>
+          </a:effectRef>
+          <a:fontRef idx="minor">
+            <a:schemeClr val="lt1"/>
+          </a:fontRef>
+        </p:style>
+        <p:txBody>
+          <a:bodyPr rtlCol="0" anchor="ctr"/>
+          <a:lstStyle/>
+          <a:p>
+            <a:pPr algn="ctr"/>
+            <a:r>
+              <a:rPr lang="en-IN" dirty="0"/>
+              <a:t>Kafka</a:t>
+            </a:r>
+          </a:p>
+          <a:p>
+            <a:pPr algn="ctr"/>
+            <a:r>
+              <a:rPr lang="en-IN" dirty="0"/>
+              <a:t>(Streaming Data)</a:t>
+            </a:r>
+          </a:p>
+        </p:txBody>
+      </p:sp>
+      <p:sp>
+        <p:nvSpPr>
+          <p:cNvPr id="10" name="Rectangle 9"/>
+          <p:cNvSpPr/>
+          <p:nvPr/>
+        </p:nvSpPr>
+        <p:spPr>
+          <a:xfrm>
+            <a:off x="5186600" y="2320275"/>
+            <a:ext cx="1558978" cy="3435948"/>
+          </a:xfrm>
+          <a:prstGeom prst="rect">
+            <a:avLst/>
+          </a:prstGeom>
+        </p:spPr>
+        <p:style>
+          <a:lnRef idx="2">
+            <a:schemeClr val="accent1">
+              <a:shade val="50000"/>
+            </a:schemeClr>
+          </a:lnRef>
+          <a:fillRef idx="1">
+            <a:schemeClr val="accent1"/>
+          </a:fillRef>
+          <a:effectRef idx="0">
+            <a:schemeClr val="accent1"/>
+          </a:effectRef>
+          <a:fontRef idx="minor">
+            <a:schemeClr val="lt1"/>
+          </a:fontRef>
+        </p:style>
+        <p:txBody>
+          <a:bodyPr rtlCol="0" anchor="ctr"/>
+          <a:lstStyle/>
+          <a:p>
+            <a:pPr algn="ctr"/>
+            <a:endParaRPr lang="en-IN"/>
+          </a:p>
+        </p:txBody>
+      </p:sp>
+      <p:sp>
+        <p:nvSpPr>
+          <p:cNvPr id="11" name="Rectangle 10"/>
+          <p:cNvSpPr/>
+          <p:nvPr/>
+        </p:nvSpPr>
+        <p:spPr>
+          <a:xfrm>
+            <a:off x="5366482" y="2971249"/>
+            <a:ext cx="1169233" cy="599610"/>
+          </a:xfrm>
+          <a:prstGeom prst="rect">
+            <a:avLst/>
+          </a:prstGeom>
+        </p:spPr>
+        <p:style>
+          <a:lnRef idx="2">
+            <a:schemeClr val="accent1"/>
+          </a:lnRef>
+          <a:fillRef idx="1">
+            <a:schemeClr val="lt1"/>
+          </a:fillRef>
+          <a:effectRef idx="0">
+            <a:schemeClr val="accent1"/>
+          </a:effectRef>
+          <a:fontRef idx="minor">
+            <a:schemeClr val="dk1"/>
+          </a:fontRef>
+        </p:style>
+        <p:txBody>
+          <a:bodyPr rtlCol="0" anchor="ctr"/>
+          <a:lstStyle/>
+          <a:p>
+            <a:pPr algn="ctr"/>
+            <a:r>
+              <a:rPr lang="en-IN" dirty="0"/>
+              <a:t>Hadoop</a:t>
+            </a:r>
+          </a:p>
+        </p:txBody>
+      </p:sp>
+      <p:sp>
+        <p:nvSpPr>
+          <p:cNvPr id="12" name="Rectangle 11"/>
+          <p:cNvSpPr/>
+          <p:nvPr/>
+        </p:nvSpPr>
+        <p:spPr>
+          <a:xfrm>
+            <a:off x="5366482" y="3765224"/>
+            <a:ext cx="1169233" cy="599610"/>
+          </a:xfrm>
+          <a:prstGeom prst="rect">
+            <a:avLst/>
+          </a:prstGeom>
+        </p:spPr>
+        <p:style>
+          <a:lnRef idx="2">
+            <a:schemeClr val="accent1"/>
+          </a:lnRef>
+          <a:fillRef idx="1">
+            <a:schemeClr val="lt1"/>
+          </a:fillRef>
+          <a:effectRef idx="0">
+            <a:schemeClr val="accent1"/>
+          </a:effectRef>
+          <a:fontRef idx="minor">
+            <a:schemeClr val="dk1"/>
+          </a:fontRef>
+        </p:style>
+        <p:txBody>
+          <a:bodyPr rtlCol="0" anchor="ctr"/>
+          <a:lstStyle/>
+          <a:p>
+            <a:pPr algn="ctr"/>
+            <a:r>
+              <a:rPr lang="en-IN" dirty="0"/>
+              <a:t>Spark</a:t>
+            </a:r>
+          </a:p>
+        </p:txBody>
+      </p:sp>
+      <p:sp>
+        <p:nvSpPr>
+          <p:cNvPr id="13" name="Rectangle 12"/>
+          <p:cNvSpPr/>
+          <p:nvPr/>
+        </p:nvSpPr>
+        <p:spPr>
+          <a:xfrm>
+            <a:off x="5366481" y="4559199"/>
+            <a:ext cx="1169233" cy="599610"/>
+          </a:xfrm>
+          <a:prstGeom prst="rect">
+            <a:avLst/>
+          </a:prstGeom>
+        </p:spPr>
+        <p:style>
+          <a:lnRef idx="2">
+            <a:schemeClr val="accent1"/>
+          </a:lnRef>
+          <a:fillRef idx="1">
+            <a:schemeClr val="lt1"/>
+          </a:fillRef>
+          <a:effectRef idx="0">
+            <a:schemeClr val="accent1"/>
+          </a:effectRef>
+          <a:fontRef idx="minor">
+            <a:schemeClr val="dk1"/>
+          </a:fontRef>
+        </p:style>
+        <p:txBody>
+          <a:bodyPr rtlCol="0" anchor="ctr"/>
+          <a:lstStyle/>
+          <a:p>
+            <a:pPr algn="ctr"/>
+            <a:r>
+              <a:rPr lang="en-IN" dirty="0"/>
+              <a:t>EDW</a:t>
+            </a:r>
+          </a:p>
+        </p:txBody>
+      </p:sp>
+      <p:sp>
+        <p:nvSpPr>
+          <p:cNvPr id="14" name="Rectangle 13"/>
+          <p:cNvSpPr/>
+          <p:nvPr/>
+        </p:nvSpPr>
+        <p:spPr>
+          <a:xfrm>
+            <a:off x="7076618" y="2320275"/>
+            <a:ext cx="2008681" cy="3435948"/>
+          </a:xfrm>
+          <a:prstGeom prst="rect">
+            <a:avLst/>
+          </a:prstGeom>
+        </p:spPr>
+        <p:style>
+          <a:lnRef idx="2">
+            <a:schemeClr val="accent1">
+              <a:shade val="50000"/>
+            </a:schemeClr>
+          </a:lnRef>
+          <a:fillRef idx="1">
+            <a:schemeClr val="accent1"/>
+          </a:fillRef>
+          <a:effectRef idx="0">
+            <a:schemeClr val="accent1"/>
+          </a:effectRef>
+          <a:fontRef idx="minor">
+            <a:schemeClr val="lt1"/>
+          </a:fontRef>
+        </p:style>
+        <p:txBody>
+          <a:bodyPr rtlCol="0" anchor="ctr"/>
+          <a:lstStyle/>
+          <a:p>
+            <a:pPr algn="ctr"/>
+            <a:endParaRPr lang="en-IN"/>
+          </a:p>
+        </p:txBody>
+      </p:sp>
+      <p:sp>
+        <p:nvSpPr>
+          <p:cNvPr id="15" name="Rectangle 14"/>
+          <p:cNvSpPr/>
+          <p:nvPr/>
+        </p:nvSpPr>
+        <p:spPr>
+          <a:xfrm>
+            <a:off x="7150317" y="2701429"/>
+            <a:ext cx="1845041" cy="1250584"/>
+          </a:xfrm>
+          <a:prstGeom prst="rect">
+            <a:avLst/>
+          </a:prstGeom>
+        </p:spPr>
+        <p:style>
+          <a:lnRef idx="2">
+            <a:schemeClr val="accent1"/>
+          </a:lnRef>
+          <a:fillRef idx="1">
+            <a:schemeClr val="lt1"/>
+          </a:fillRef>
+          <a:effectRef idx="0">
+            <a:schemeClr val="accent1"/>
+          </a:effectRef>
+          <a:fontRef idx="minor">
+            <a:schemeClr val="dk1"/>
+          </a:fontRef>
+        </p:style>
+        <p:txBody>
+          <a:bodyPr rtlCol="0" anchor="ctr"/>
+          <a:lstStyle/>
+          <a:p>
+            <a:pPr algn="ctr"/>
+            <a:r>
+              <a:rPr lang="en-IN" dirty="0"/>
+              <a:t>BI Tools</a:t>
+            </a:r>
+          </a:p>
+          <a:p>
+            <a:pPr algn="ctr"/>
+            <a:r>
+              <a:rPr lang="en-IN" dirty="0"/>
+              <a:t>(Tableau/</a:t>
+            </a:r>
+            <a:r>
+              <a:rPr lang="en-IN" dirty="0" err="1"/>
+              <a:t>Talend</a:t>
+            </a:r>
+            <a:r>
+              <a:rPr lang="en-IN" dirty="0"/>
+              <a:t>)</a:t>
+            </a:r>
+          </a:p>
+        </p:txBody>
+      </p:sp>
+      <p:sp>
+        <p:nvSpPr>
+          <p:cNvPr id="17" name="Rectangle 16"/>
+          <p:cNvSpPr/>
+          <p:nvPr/>
+        </p:nvSpPr>
+        <p:spPr>
+          <a:xfrm>
+            <a:off x="7150316" y="4289379"/>
+            <a:ext cx="1845041" cy="913218"/>
+          </a:xfrm>
+          <a:prstGeom prst="rect">
+            <a:avLst/>
+          </a:prstGeom>
+        </p:spPr>
+        <p:style>
+          <a:lnRef idx="2">
+            <a:schemeClr val="accent1"/>
+          </a:lnRef>
+          <a:fillRef idx="1">
+            <a:schemeClr val="lt1"/>
+          </a:fillRef>
+          <a:effectRef idx="0">
+            <a:schemeClr val="accent1"/>
+          </a:effectRef>
+          <a:fontRef idx="minor">
+            <a:schemeClr val="dk1"/>
+          </a:fontRef>
+        </p:style>
+        <p:txBody>
+          <a:bodyPr rtlCol="0" anchor="ctr"/>
+          <a:lstStyle/>
+          <a:p>
+            <a:pPr algn="ctr"/>
+            <a:r>
+              <a:rPr lang="en-IN" dirty="0"/>
+              <a:t>End User Application</a:t>
+            </a:r>
+          </a:p>
+        </p:txBody>
+      </p:sp>
+      <p:sp>
+        <p:nvSpPr>
+          <p:cNvPr id="18" name="TextBox 17">
+            <a:extLst>
+              <a:ext uri="{FF2B5EF4-FFF2-40B4-BE49-F238E27FC236}">
+                <a16:creationId xmlns:a16="http://schemas.microsoft.com/office/drawing/2014/main" id="{BEC20B13-1C57-4E13-BF1D-4D176D18C63F}"/>
+              </a:ext>
+            </a:extLst>
+          </p:cNvPr>
+          <p:cNvSpPr txBox="1"/>
+          <p:nvPr/>
+        </p:nvSpPr>
+        <p:spPr>
+          <a:xfrm>
+            <a:off x="5107238" y="6421804"/>
+            <a:ext cx="1711879" cy="369332"/>
+          </a:xfrm>
+          <a:prstGeom prst="rect">
+            <a:avLst/>
+          </a:prstGeom>
+          <a:noFill/>
+        </p:spPr>
+        <p:txBody>
+          <a:bodyPr wrap="none" rtlCol="0">
+            <a:spAutoFit/>
+          </a:bodyPr>
+          <a:lstStyle/>
+          <a:p>
+            <a:r>
+              <a:rPr lang="en-IN" dirty="0"/>
+              <a:t>Analytics Engine</a:t>
+            </a:r>
+          </a:p>
+        </p:txBody>
+      </p:sp>
+      <p:sp>
+        <p:nvSpPr>
+          <p:cNvPr id="19" name="TextBox 18">
+            <a:extLst>
+              <a:ext uri="{FF2B5EF4-FFF2-40B4-BE49-F238E27FC236}">
+                <a16:creationId xmlns:a16="http://schemas.microsoft.com/office/drawing/2014/main" id="{7CE41E99-A7AB-4CE3-A8D9-21C23105C10A}"/>
+              </a:ext>
+            </a:extLst>
+          </p:cNvPr>
+          <p:cNvSpPr txBox="1"/>
+          <p:nvPr/>
+        </p:nvSpPr>
+        <p:spPr>
+          <a:xfrm>
+            <a:off x="2453978" y="6421804"/>
+            <a:ext cx="1539589" cy="369332"/>
+          </a:xfrm>
+          <a:prstGeom prst="rect">
+            <a:avLst/>
+          </a:prstGeom>
+          <a:noFill/>
+        </p:spPr>
+        <p:txBody>
+          <a:bodyPr wrap="none" rtlCol="0">
+            <a:spAutoFit/>
+          </a:bodyPr>
+          <a:lstStyle/>
+          <a:p>
+            <a:r>
+              <a:rPr lang="en-IN" dirty="0"/>
+              <a:t>Log Forwarder</a:t>
+            </a:r>
+          </a:p>
+        </p:txBody>
+      </p:sp>
+      <p:sp>
+        <p:nvSpPr>
+          <p:cNvPr id="20" name="TextBox 19">
+            <a:extLst>
+              <a:ext uri="{FF2B5EF4-FFF2-40B4-BE49-F238E27FC236}">
+                <a16:creationId xmlns:a16="http://schemas.microsoft.com/office/drawing/2014/main" id="{7E4DC158-4337-4578-82E3-15E21FDF22DB}"/>
+              </a:ext>
+            </a:extLst>
+          </p:cNvPr>
+          <p:cNvSpPr txBox="1"/>
+          <p:nvPr/>
+        </p:nvSpPr>
+        <p:spPr>
+          <a:xfrm>
+            <a:off x="0" y="6419092"/>
+            <a:ext cx="2089803" cy="369332"/>
+          </a:xfrm>
+          <a:prstGeom prst="rect">
+            <a:avLst/>
+          </a:prstGeom>
+          <a:noFill/>
+        </p:spPr>
+        <p:txBody>
+          <a:bodyPr wrap="none" rtlCol="0">
+            <a:spAutoFit/>
+          </a:bodyPr>
+          <a:lstStyle/>
+          <a:p>
+            <a:r>
+              <a:rPr lang="en-IN" dirty="0"/>
+              <a:t>Multiple Application</a:t>
+            </a:r>
+          </a:p>
+        </p:txBody>
+      </p:sp>
+      <p:sp>
+        <p:nvSpPr>
+          <p:cNvPr id="21" name="TextBox 20">
+            <a:extLst>
+              <a:ext uri="{FF2B5EF4-FFF2-40B4-BE49-F238E27FC236}">
+                <a16:creationId xmlns:a16="http://schemas.microsoft.com/office/drawing/2014/main" id="{5A05D4EE-8B39-4DB4-864A-B72E8A519EE5}"/>
+              </a:ext>
+            </a:extLst>
+          </p:cNvPr>
+          <p:cNvSpPr txBox="1"/>
+          <p:nvPr/>
+        </p:nvSpPr>
+        <p:spPr>
+          <a:xfrm>
+            <a:off x="7005223" y="6419092"/>
+            <a:ext cx="2386423" cy="369332"/>
+          </a:xfrm>
+          <a:prstGeom prst="rect">
+            <a:avLst/>
+          </a:prstGeom>
+          <a:noFill/>
+        </p:spPr>
+        <p:txBody>
+          <a:bodyPr wrap="none" rtlCol="0">
+            <a:spAutoFit/>
+          </a:bodyPr>
+          <a:lstStyle/>
+          <a:p>
+            <a:r>
+              <a:rPr lang="en-IN" dirty="0"/>
+              <a:t>Dashboard &amp; Reporting</a:t>
+            </a:r>
+          </a:p>
+        </p:txBody>
+      </p:sp>
+    </p:spTree>
+    <p:extLst>
+      <p:ext uri="{BB962C8B-B14F-4D97-AF65-F5344CB8AC3E}">
+        <p14:creationId xmlns:p14="http://schemas.microsoft.com/office/powerpoint/2010/main" val="1849109885"/>
+      </p:ext>
+    </p:extLst>
+  </p:cSld>
+  <p:clrMapOvr>
+    <a:masterClrMapping/>
+  </p:clrMapOvr>
+</p:sld>
+</file>
+
+<file path=ppt/slides/slide7.xml><?xml version="1.0" encoding="utf-8"?>
+<p:sld xmlns:a="http://schemas.openxmlformats.org/drawingml/2006/main" xmlns:r="http://schemas.openxmlformats.org/officeDocument/2006/relationships" xmlns:p="http://schemas.openxmlformats.org/presentationml/2006/main">
+  <p:cSld>
+    <p:spTree>
+      <p:nvGrpSpPr>
+        <p:cNvPr id="1" name=""/>
+        <p:cNvGrpSpPr/>
+        <p:nvPr/>
+      </p:nvGrpSpPr>
+      <p:grpSpPr>
+        <a:xfrm>
+          <a:off x="0" y="0"/>
+          <a:ext cx="0" cy="0"/>
+          <a:chOff x="0" y="0"/>
+          <a:chExt cx="0" cy="0"/>
+        </a:xfrm>
+      </p:grpSpPr>
+      <p:sp>
+        <p:nvSpPr>
+          <p:cNvPr id="2" name="Title 1"/>
+          <p:cNvSpPr>
+            <a:spLocks noGrp="1"/>
+          </p:cNvSpPr>
+          <p:nvPr>
+            <p:ph type="title"/>
+          </p:nvPr>
+        </p:nvSpPr>
+        <p:spPr/>
+        <p:txBody>
+          <a:bodyPr/>
+          <a:lstStyle/>
+          <a:p>
+            <a:r>
+              <a:rPr lang="en-IN" dirty="0"/>
+              <a:t>Problems Faced</a:t>
+            </a:r>
+          </a:p>
+        </p:txBody>
+      </p:sp>
+      <p:sp>
+        <p:nvSpPr>
+          <p:cNvPr id="3" name="Content Placeholder 2"/>
+          <p:cNvSpPr>
+            <a:spLocks noGrp="1"/>
+          </p:cNvSpPr>
+          <p:nvPr>
+            <p:ph idx="1"/>
+          </p:nvPr>
+        </p:nvSpPr>
+        <p:spPr/>
+        <p:txBody>
+          <a:bodyPr/>
+          <a:lstStyle/>
+          <a:p>
+            <a:r>
+              <a:rPr lang="en-IN" dirty="0"/>
+              <a:t>Data coming from different sources has different format.</a:t>
+            </a:r>
+          </a:p>
+          <a:p>
+            <a:r>
+              <a:rPr lang="en-IN" dirty="0"/>
+              <a:t>Implementing near real-time data pipeline for analysis.</a:t>
+            </a:r>
+          </a:p>
+          <a:p>
+            <a:r>
+              <a:rPr lang="en-IN" dirty="0"/>
+              <a:t>Scalability of the prototype created.</a:t>
+            </a:r>
+          </a:p>
+        </p:txBody>
+      </p:sp>
+    </p:spTree>
+    <p:extLst>
+      <p:ext uri="{BB962C8B-B14F-4D97-AF65-F5344CB8AC3E}">
+        <p14:creationId xmlns:p14="http://schemas.microsoft.com/office/powerpoint/2010/main" val="1091412028"/>
+      </p:ext>
+    </p:extLst>
+  </p:cSld>
+  <p:clrMapOvr>
+    <a:masterClrMapping/>
+  </p:clrMapOvr>
+</p:sld>
+</file>
+
+<file path=ppt/slides/slide8.xml><?xml version="1.0" encoding="utf-8"?>
+<p:sld xmlns:a="http://schemas.openxmlformats.org/drawingml/2006/main" xmlns:r="http://schemas.openxmlformats.org/officeDocument/2006/relationships" xmlns:p="http://schemas.openxmlformats.org/presentationml/2006/main">
+  <p:cSld>
+    <p:spTree>
+      <p:nvGrpSpPr>
+        <p:cNvPr id="1" name=""/>
+        <p:cNvGrpSpPr/>
+        <p:nvPr/>
+      </p:nvGrpSpPr>
+      <p:grpSpPr>
+        <a:xfrm>
+          <a:off x="0" y="0"/>
+          <a:ext cx="0" cy="0"/>
+          <a:chOff x="0" y="0"/>
+          <a:chExt cx="0" cy="0"/>
+        </a:xfrm>
+      </p:grpSpPr>
+      <p:sp>
+        <p:nvSpPr>
+          <p:cNvPr id="2" name="Title 1"/>
+          <p:cNvSpPr>
+            <a:spLocks noGrp="1"/>
+          </p:cNvSpPr>
+          <p:nvPr>
+            <p:ph type="title"/>
+          </p:nvPr>
+        </p:nvSpPr>
+        <p:spPr/>
+        <p:txBody>
+          <a:bodyPr/>
+          <a:lstStyle/>
+          <a:p>
+            <a:r>
+              <a:rPr lang="en-IN" dirty="0"/>
+              <a:t>Conclusion</a:t>
+            </a:r>
+          </a:p>
+        </p:txBody>
+      </p:sp>
+      <p:sp>
+        <p:nvSpPr>
+          <p:cNvPr id="3" name="Content Placeholder 2"/>
+          <p:cNvSpPr>
+            <a:spLocks noGrp="1"/>
+          </p:cNvSpPr>
+          <p:nvPr>
+            <p:ph idx="1"/>
+          </p:nvPr>
+        </p:nvSpPr>
+        <p:spPr/>
+        <p:txBody>
+          <a:bodyPr/>
+          <a:lstStyle/>
+          <a:p>
+            <a:r>
+              <a:rPr lang="en-IN" dirty="0"/>
+              <a:t>Ease in decision making.</a:t>
+            </a:r>
+          </a:p>
+          <a:p>
+            <a:r>
+              <a:rPr lang="en-IN" dirty="0"/>
+              <a:t>Integrated approach.</a:t>
+            </a:r>
+          </a:p>
+          <a:p>
+            <a:r>
+              <a:rPr lang="en-IN" dirty="0"/>
+              <a:t>Informed decisions.</a:t>
+            </a:r>
+          </a:p>
+        </p:txBody>
+      </p:sp>
+    </p:spTree>
+    <p:extLst>
+      <p:ext uri="{BB962C8B-B14F-4D97-AF65-F5344CB8AC3E}">
+        <p14:creationId xmlns:p14="http://schemas.microsoft.com/office/powerpoint/2010/main" val="1741744484"/>
       </p:ext>
     </p:extLst>
   </p:cSld>

</xml_diff>